<commit_message>
Answer to question 6,7
</commit_message>
<xml_diff>
--- a/Question5MLAssignmentPartA.pptx
+++ b/Question5MLAssignmentPartA.pptx
@@ -15,6 +15,8 @@
     <p:sldId id="264" r:id="rId9"/>
     <p:sldId id="263" r:id="rId10"/>
     <p:sldId id="265" r:id="rId11"/>
+    <p:sldId id="267" r:id="rId12"/>
+    <p:sldId id="266" r:id="rId13"/>
   </p:sldIdLst>
   <p:sldSz cx="12192000" cy="6858000"/>
   <p:notesSz cx="6858000" cy="9144000"/>
@@ -5627,7 +5629,7 @@
               <a:buChar char="•"/>
             </a:pPr>
             <a:r>
-              <a:rPr lang="en-US" sz="2000"/>
+              <a:rPr lang="en-US" sz="2000" dirty="0"/>
               <a:t>Grid Search for best params</a:t>
             </a:r>
           </a:p>
@@ -5667,6 +5669,1175 @@
     <p:extLst>
       <p:ext uri="{BB962C8B-B14F-4D97-AF65-F5344CB8AC3E}">
         <p14:creationId xmlns:p14="http://schemas.microsoft.com/office/powerpoint/2010/main" val="1225171145"/>
+      </p:ext>
+    </p:extLst>
+  </p:cSld>
+  <p:clrMapOvr>
+    <a:masterClrMapping/>
+  </p:clrMapOvr>
+</p:sld>
+</file>
+
+<file path=ppt/slides/slide11.xml><?xml version="1.0" encoding="utf-8"?>
+<p:sld xmlns:a="http://schemas.openxmlformats.org/drawingml/2006/main" xmlns:r="http://schemas.openxmlformats.org/officeDocument/2006/relationships" xmlns:p="http://schemas.openxmlformats.org/presentationml/2006/main">
+  <p:cSld>
+    <p:bg>
+      <p:bgPr>
+        <a:solidFill>
+          <a:schemeClr val="bg1"/>
+        </a:solidFill>
+        <a:effectLst/>
+      </p:bgPr>
+    </p:bg>
+    <p:spTree>
+      <p:nvGrpSpPr>
+        <p:cNvPr id="1" name=""/>
+        <p:cNvGrpSpPr/>
+        <p:nvPr/>
+      </p:nvGrpSpPr>
+      <p:grpSpPr>
+        <a:xfrm>
+          <a:off x="0" y="0"/>
+          <a:ext cx="0" cy="0"/>
+          <a:chOff x="0" y="0"/>
+          <a:chExt cx="0" cy="0"/>
+        </a:xfrm>
+      </p:grpSpPr>
+      <p:sp useBgFill="1">
+        <p:nvSpPr>
+          <p:cNvPr id="15" name="Rectangle 14">
+            <a:extLst>
+              <a:ext uri="{FF2B5EF4-FFF2-40B4-BE49-F238E27FC236}">
+                <a16:creationId xmlns:a16="http://schemas.microsoft.com/office/drawing/2014/main" id="{0288C6B4-AFC3-407F-A595-EFFD38D4CCAF}"/>
+              </a:ext>
+              <a:ext uri="{C183D7F6-B498-43B3-948B-1728B52AA6E4}">
+                <adec:decorative xmlns:adec="http://schemas.microsoft.com/office/drawing/2017/decorative" val="1"/>
+              </a:ext>
+            </a:extLst>
+          </p:cNvPr>
+          <p:cNvSpPr>
+            <a:spLocks noGrp="1" noRot="1" noChangeAspect="1" noMove="1" noResize="1" noEditPoints="1" noAdjustHandles="1" noChangeArrowheads="1" noChangeShapeType="1" noTextEdit="1"/>
+          </p:cNvSpPr>
+          <p:nvPr>
+            <p:extLst>
+              <p:ext uri="{386F3935-93C4-4BCD-93E2-E3B085C9AB24}">
+                <p16:designElem xmlns:p16="http://schemas.microsoft.com/office/powerpoint/2015/main" val="1"/>
+              </p:ext>
+            </p:extLst>
+          </p:nvPr>
+        </p:nvSpPr>
+        <p:spPr>
+          <a:xfrm>
+            <a:off x="0" y="0"/>
+            <a:ext cx="12192000" cy="6858000"/>
+          </a:xfrm>
+          <a:prstGeom prst="rect">
+            <a:avLst/>
+          </a:prstGeom>
+          <a:ln>
+            <a:noFill/>
+          </a:ln>
+        </p:spPr>
+        <p:style>
+          <a:lnRef idx="2">
+            <a:schemeClr val="accent1">
+              <a:shade val="50000"/>
+            </a:schemeClr>
+          </a:lnRef>
+          <a:fillRef idx="1">
+            <a:schemeClr val="accent1"/>
+          </a:fillRef>
+          <a:effectRef idx="0">
+            <a:schemeClr val="accent1"/>
+          </a:effectRef>
+          <a:fontRef idx="minor">
+            <a:schemeClr val="lt1"/>
+          </a:fontRef>
+        </p:style>
+        <p:txBody>
+          <a:bodyPr rtlCol="0" anchor="ctr"/>
+          <a:lstStyle/>
+          <a:p>
+            <a:pPr algn="ctr"/>
+            <a:endParaRPr lang="en-US"/>
+          </a:p>
+        </p:txBody>
+      </p:sp>
+      <p:sp useBgFill="1">
+        <p:nvSpPr>
+          <p:cNvPr id="17" name="Freeform: Shape 16">
+            <a:extLst>
+              <a:ext uri="{FF2B5EF4-FFF2-40B4-BE49-F238E27FC236}">
+                <a16:creationId xmlns:a16="http://schemas.microsoft.com/office/drawing/2014/main" id="{CF236821-17FE-429B-8D2C-08E13A64EA40}"/>
+              </a:ext>
+              <a:ext uri="{C183D7F6-B498-43B3-948B-1728B52AA6E4}">
+                <adec:decorative xmlns:adec="http://schemas.microsoft.com/office/drawing/2017/decorative" val="1"/>
+              </a:ext>
+            </a:extLst>
+          </p:cNvPr>
+          <p:cNvSpPr>
+            <a:spLocks noGrp="1" noRot="1" noChangeAspect="1" noMove="1" noResize="1" noEditPoints="1" noAdjustHandles="1" noChangeArrowheads="1" noChangeShapeType="1" noTextEdit="1"/>
+          </p:cNvSpPr>
+          <p:nvPr>
+            <p:extLst>
+              <p:ext uri="{386F3935-93C4-4BCD-93E2-E3B085C9AB24}">
+                <p16:designElem xmlns:p16="http://schemas.microsoft.com/office/powerpoint/2015/main" val="1"/>
+              </p:ext>
+            </p:extLst>
+          </p:nvPr>
+        </p:nvSpPr>
+        <p:spPr>
+          <a:xfrm>
+            <a:off x="-1" y="0"/>
+            <a:ext cx="4455673" cy="6858000"/>
+          </a:xfrm>
+          <a:custGeom>
+            <a:avLst/>
+            <a:gdLst>
+              <a:gd name="connsiteX0" fmla="*/ 0 w 4455673"/>
+              <a:gd name="connsiteY0" fmla="*/ 0 h 6858000"/>
+              <a:gd name="connsiteX1" fmla="*/ 3242695 w 4455673"/>
+              <a:gd name="connsiteY1" fmla="*/ 0 h 6858000"/>
+              <a:gd name="connsiteX2" fmla="*/ 3305678 w 4455673"/>
+              <a:gd name="connsiteY2" fmla="*/ 69271 h 6858000"/>
+              <a:gd name="connsiteX3" fmla="*/ 4455673 w 4455673"/>
+              <a:gd name="connsiteY3" fmla="*/ 3429000 h 6858000"/>
+              <a:gd name="connsiteX4" fmla="*/ 3305678 w 4455673"/>
+              <a:gd name="connsiteY4" fmla="*/ 6788730 h 6858000"/>
+              <a:gd name="connsiteX5" fmla="*/ 3242695 w 4455673"/>
+              <a:gd name="connsiteY5" fmla="*/ 6858000 h 6858000"/>
+              <a:gd name="connsiteX6" fmla="*/ 0 w 4455673"/>
+              <a:gd name="connsiteY6" fmla="*/ 6858000 h 6858000"/>
+            </a:gdLst>
+            <a:ahLst/>
+            <a:cxnLst>
+              <a:cxn ang="0">
+                <a:pos x="connsiteX0" y="connsiteY0"/>
+              </a:cxn>
+              <a:cxn ang="0">
+                <a:pos x="connsiteX1" y="connsiteY1"/>
+              </a:cxn>
+              <a:cxn ang="0">
+                <a:pos x="connsiteX2" y="connsiteY2"/>
+              </a:cxn>
+              <a:cxn ang="0">
+                <a:pos x="connsiteX3" y="connsiteY3"/>
+              </a:cxn>
+              <a:cxn ang="0">
+                <a:pos x="connsiteX4" y="connsiteY4"/>
+              </a:cxn>
+              <a:cxn ang="0">
+                <a:pos x="connsiteX5" y="connsiteY5"/>
+              </a:cxn>
+              <a:cxn ang="0">
+                <a:pos x="connsiteX6" y="connsiteY6"/>
+              </a:cxn>
+            </a:cxnLst>
+            <a:rect l="l" t="t" r="r" b="b"/>
+            <a:pathLst>
+              <a:path w="4455673" h="6858000">
+                <a:moveTo>
+                  <a:pt x="0" y="0"/>
+                </a:moveTo>
+                <a:lnTo>
+                  <a:pt x="3242695" y="0"/>
+                </a:lnTo>
+                <a:lnTo>
+                  <a:pt x="3305678" y="69271"/>
+                </a:lnTo>
+                <a:cubicBezTo>
+                  <a:pt x="4016204" y="929100"/>
+                  <a:pt x="4455673" y="2116944"/>
+                  <a:pt x="4455673" y="3429000"/>
+                </a:cubicBezTo>
+                <a:cubicBezTo>
+                  <a:pt x="4455673" y="4741056"/>
+                  <a:pt x="4016204" y="5928900"/>
+                  <a:pt x="3305678" y="6788730"/>
+                </a:cubicBezTo>
+                <a:lnTo>
+                  <a:pt x="3242695" y="6858000"/>
+                </a:lnTo>
+                <a:lnTo>
+                  <a:pt x="0" y="6858000"/>
+                </a:lnTo>
+                <a:close/>
+              </a:path>
+            </a:pathLst>
+          </a:custGeom>
+          <a:ln w="9525">
+            <a:solidFill>
+              <a:srgbClr val="EFEFEF"/>
+            </a:solidFill>
+          </a:ln>
+          <a:effectLst>
+            <a:outerShdw blurRad="88900" dist="38100" algn="l" rotWithShape="0">
+              <a:schemeClr val="bg1">
+                <a:lumMod val="85000"/>
+                <a:alpha val="50000"/>
+              </a:schemeClr>
+            </a:outerShdw>
+          </a:effectLst>
+        </p:spPr>
+        <p:style>
+          <a:lnRef idx="2">
+            <a:schemeClr val="accent1">
+              <a:shade val="50000"/>
+            </a:schemeClr>
+          </a:lnRef>
+          <a:fillRef idx="1">
+            <a:schemeClr val="accent1"/>
+          </a:fillRef>
+          <a:effectRef idx="0">
+            <a:schemeClr val="accent1"/>
+          </a:effectRef>
+          <a:fontRef idx="minor">
+            <a:schemeClr val="lt1"/>
+          </a:fontRef>
+        </p:style>
+        <p:txBody>
+          <a:bodyPr wrap="square" rtlCol="0" anchor="ctr">
+            <a:noAutofit/>
+          </a:bodyPr>
+          <a:lstStyle/>
+          <a:p>
+            <a:pPr marL="0" marR="0" lvl="0" indent="0" algn="ctr" defTabSz="914400" rtl="0" eaLnBrk="1" fontAlgn="auto" latinLnBrk="0" hangingPunct="1">
+              <a:lnSpc>
+                <a:spcPct val="100000"/>
+              </a:lnSpc>
+              <a:spcBef>
+                <a:spcPts val="0"/>
+              </a:spcBef>
+              <a:spcAft>
+                <a:spcPts val="0"/>
+              </a:spcAft>
+              <a:buClrTx/>
+              <a:buSzTx/>
+              <a:buFontTx/>
+              <a:buNone/>
+              <a:tabLst/>
+              <a:defRPr/>
+            </a:pPr>
+            <a:endParaRPr kumimoji="0" lang="en-US" sz="1800" b="0" i="0" u="none" strike="noStrike" kern="1200" cap="none" spc="0" normalizeH="0" baseline="0" noProof="0">
+              <a:ln>
+                <a:noFill/>
+              </a:ln>
+              <a:solidFill>
+                <a:prstClr val="white"/>
+              </a:solidFill>
+              <a:effectLst/>
+              <a:uLnTx/>
+              <a:uFillTx/>
+              <a:latin typeface="Calibri" panose="020F0502020204030204"/>
+              <a:ea typeface="+mn-ea"/>
+              <a:cs typeface="+mn-cs"/>
+            </a:endParaRPr>
+          </a:p>
+        </p:txBody>
+      </p:sp>
+      <p:sp useBgFill="1">
+        <p:nvSpPr>
+          <p:cNvPr id="19" name="Freeform: Shape 18">
+            <a:extLst>
+              <a:ext uri="{FF2B5EF4-FFF2-40B4-BE49-F238E27FC236}">
+                <a16:creationId xmlns:a16="http://schemas.microsoft.com/office/drawing/2014/main" id="{C0BDBCD2-E081-43AB-9119-C55465E59757}"/>
+              </a:ext>
+              <a:ext uri="{C183D7F6-B498-43B3-948B-1728B52AA6E4}">
+                <adec:decorative xmlns:adec="http://schemas.microsoft.com/office/drawing/2017/decorative" val="1"/>
+              </a:ext>
+            </a:extLst>
+          </p:cNvPr>
+          <p:cNvSpPr>
+            <a:spLocks noGrp="1" noRot="1" noChangeAspect="1" noMove="1" noResize="1" noEditPoints="1" noAdjustHandles="1" noChangeArrowheads="1" noChangeShapeType="1" noTextEdit="1"/>
+          </p:cNvSpPr>
+          <p:nvPr>
+            <p:extLst>
+              <p:ext uri="{386F3935-93C4-4BCD-93E2-E3B085C9AB24}">
+                <p16:designElem xmlns:p16="http://schemas.microsoft.com/office/powerpoint/2015/main" val="1"/>
+              </p:ext>
+            </p:extLst>
+          </p:nvPr>
+        </p:nvSpPr>
+        <p:spPr>
+          <a:xfrm>
+            <a:off x="0" y="0"/>
+            <a:ext cx="4446529" cy="6858000"/>
+          </a:xfrm>
+          <a:custGeom>
+            <a:avLst/>
+            <a:gdLst>
+              <a:gd name="connsiteX0" fmla="*/ 0 w 4446529"/>
+              <a:gd name="connsiteY0" fmla="*/ 0 h 6858000"/>
+              <a:gd name="connsiteX1" fmla="*/ 3233551 w 4446529"/>
+              <a:gd name="connsiteY1" fmla="*/ 0 h 6858000"/>
+              <a:gd name="connsiteX2" fmla="*/ 3296534 w 4446529"/>
+              <a:gd name="connsiteY2" fmla="*/ 69271 h 6858000"/>
+              <a:gd name="connsiteX3" fmla="*/ 4446529 w 4446529"/>
+              <a:gd name="connsiteY3" fmla="*/ 3429000 h 6858000"/>
+              <a:gd name="connsiteX4" fmla="*/ 3296534 w 4446529"/>
+              <a:gd name="connsiteY4" fmla="*/ 6788730 h 6858000"/>
+              <a:gd name="connsiteX5" fmla="*/ 3233551 w 4446529"/>
+              <a:gd name="connsiteY5" fmla="*/ 6858000 h 6858000"/>
+              <a:gd name="connsiteX6" fmla="*/ 0 w 4446529"/>
+              <a:gd name="connsiteY6" fmla="*/ 6858000 h 6858000"/>
+            </a:gdLst>
+            <a:ahLst/>
+            <a:cxnLst>
+              <a:cxn ang="0">
+                <a:pos x="connsiteX0" y="connsiteY0"/>
+              </a:cxn>
+              <a:cxn ang="0">
+                <a:pos x="connsiteX1" y="connsiteY1"/>
+              </a:cxn>
+              <a:cxn ang="0">
+                <a:pos x="connsiteX2" y="connsiteY2"/>
+              </a:cxn>
+              <a:cxn ang="0">
+                <a:pos x="connsiteX3" y="connsiteY3"/>
+              </a:cxn>
+              <a:cxn ang="0">
+                <a:pos x="connsiteX4" y="connsiteY4"/>
+              </a:cxn>
+              <a:cxn ang="0">
+                <a:pos x="connsiteX5" y="connsiteY5"/>
+              </a:cxn>
+              <a:cxn ang="0">
+                <a:pos x="connsiteX6" y="connsiteY6"/>
+              </a:cxn>
+            </a:cxnLst>
+            <a:rect l="l" t="t" r="r" b="b"/>
+            <a:pathLst>
+              <a:path w="4446529" h="6858000">
+                <a:moveTo>
+                  <a:pt x="0" y="0"/>
+                </a:moveTo>
+                <a:lnTo>
+                  <a:pt x="3233551" y="0"/>
+                </a:lnTo>
+                <a:lnTo>
+                  <a:pt x="3296534" y="69271"/>
+                </a:lnTo>
+                <a:cubicBezTo>
+                  <a:pt x="4007060" y="929100"/>
+                  <a:pt x="4446529" y="2116944"/>
+                  <a:pt x="4446529" y="3429000"/>
+                </a:cubicBezTo>
+                <a:cubicBezTo>
+                  <a:pt x="4446529" y="4741056"/>
+                  <a:pt x="4007060" y="5928900"/>
+                  <a:pt x="3296534" y="6788730"/>
+                </a:cubicBezTo>
+                <a:lnTo>
+                  <a:pt x="3233551" y="6858000"/>
+                </a:lnTo>
+                <a:lnTo>
+                  <a:pt x="0" y="6858000"/>
+                </a:lnTo>
+                <a:close/>
+              </a:path>
+            </a:pathLst>
+          </a:custGeom>
+          <a:ln w="9525">
+            <a:noFill/>
+          </a:ln>
+          <a:effectLst/>
+        </p:spPr>
+        <p:style>
+          <a:lnRef idx="2">
+            <a:schemeClr val="accent1">
+              <a:shade val="50000"/>
+            </a:schemeClr>
+          </a:lnRef>
+          <a:fillRef idx="1">
+            <a:schemeClr val="accent1"/>
+          </a:fillRef>
+          <a:effectRef idx="0">
+            <a:schemeClr val="accent1"/>
+          </a:effectRef>
+          <a:fontRef idx="minor">
+            <a:schemeClr val="lt1"/>
+          </a:fontRef>
+        </p:style>
+        <p:txBody>
+          <a:bodyPr wrap="square" rtlCol="0" anchor="ctr">
+            <a:noAutofit/>
+          </a:bodyPr>
+          <a:lstStyle/>
+          <a:p>
+            <a:pPr marL="0" marR="0" lvl="0" indent="0" algn="ctr" defTabSz="914400" rtl="0" eaLnBrk="1" fontAlgn="auto" latinLnBrk="0" hangingPunct="1">
+              <a:lnSpc>
+                <a:spcPct val="100000"/>
+              </a:lnSpc>
+              <a:spcBef>
+                <a:spcPts val="0"/>
+              </a:spcBef>
+              <a:spcAft>
+                <a:spcPts val="0"/>
+              </a:spcAft>
+              <a:buClrTx/>
+              <a:buSzTx/>
+              <a:buFontTx/>
+              <a:buNone/>
+              <a:tabLst/>
+              <a:defRPr/>
+            </a:pPr>
+            <a:endParaRPr kumimoji="0" lang="en-US" sz="1800" b="0" i="0" u="none" strike="noStrike" kern="1200" cap="none" spc="0" normalizeH="0" baseline="0" noProof="0">
+              <a:ln>
+                <a:noFill/>
+              </a:ln>
+              <a:solidFill>
+                <a:prstClr val="white"/>
+              </a:solidFill>
+              <a:effectLst/>
+              <a:uLnTx/>
+              <a:uFillTx/>
+              <a:latin typeface="Calibri" panose="020F0502020204030204"/>
+              <a:ea typeface="+mn-ea"/>
+              <a:cs typeface="+mn-cs"/>
+            </a:endParaRPr>
+          </a:p>
+        </p:txBody>
+      </p:sp>
+      <p:sp>
+        <p:nvSpPr>
+          <p:cNvPr id="21" name="Rectangle 20">
+            <a:extLst>
+              <a:ext uri="{FF2B5EF4-FFF2-40B4-BE49-F238E27FC236}">
+                <a16:creationId xmlns:a16="http://schemas.microsoft.com/office/drawing/2014/main" id="{98E79BE4-34FE-485A-98A5-92CE8F7C4743}"/>
+              </a:ext>
+              <a:ext uri="{C183D7F6-B498-43B3-948B-1728B52AA6E4}">
+                <adec:decorative xmlns:adec="http://schemas.microsoft.com/office/drawing/2017/decorative" val="1"/>
+              </a:ext>
+            </a:extLst>
+          </p:cNvPr>
+          <p:cNvSpPr>
+            <a:spLocks noGrp="1" noRot="1" noChangeAspect="1" noMove="1" noResize="1" noEditPoints="1" noAdjustHandles="1" noChangeArrowheads="1" noChangeShapeType="1" noTextEdit="1"/>
+          </p:cNvSpPr>
+          <p:nvPr>
+            <p:extLst>
+              <p:ext uri="{386F3935-93C4-4BCD-93E2-E3B085C9AB24}">
+                <p16:designElem xmlns:p16="http://schemas.microsoft.com/office/powerpoint/2015/main" val="1"/>
+              </p:ext>
+            </p:extLst>
+          </p:nvPr>
+        </p:nvSpPr>
+        <p:spPr>
+          <a:xfrm>
+            <a:off x="0" y="1426546"/>
+            <a:ext cx="128016" cy="653903"/>
+          </a:xfrm>
+          <a:prstGeom prst="rect">
+            <a:avLst/>
+          </a:prstGeom>
+          <a:solidFill>
+            <a:schemeClr val="accent2"/>
+          </a:solidFill>
+          <a:ln>
+            <a:noFill/>
+          </a:ln>
+        </p:spPr>
+        <p:style>
+          <a:lnRef idx="2">
+            <a:schemeClr val="accent1">
+              <a:shade val="50000"/>
+            </a:schemeClr>
+          </a:lnRef>
+          <a:fillRef idx="1">
+            <a:schemeClr val="accent1"/>
+          </a:fillRef>
+          <a:effectRef idx="0">
+            <a:schemeClr val="accent1"/>
+          </a:effectRef>
+          <a:fontRef idx="minor">
+            <a:schemeClr val="lt1"/>
+          </a:fontRef>
+        </p:style>
+        <p:txBody>
+          <a:bodyPr rtlCol="0" anchor="ctr"/>
+          <a:lstStyle/>
+          <a:p>
+            <a:pPr algn="ctr"/>
+            <a:endParaRPr lang="en-US">
+              <a:solidFill>
+                <a:prstClr val="white"/>
+              </a:solidFill>
+              <a:latin typeface="Calibri" panose="020F0502020204030204"/>
+            </a:endParaRPr>
+          </a:p>
+        </p:txBody>
+      </p:sp>
+      <p:sp>
+        <p:nvSpPr>
+          <p:cNvPr id="23" name="Rectangle 22">
+            <a:extLst>
+              <a:ext uri="{FF2B5EF4-FFF2-40B4-BE49-F238E27FC236}">
+                <a16:creationId xmlns:a16="http://schemas.microsoft.com/office/drawing/2014/main" id="{7A5F0580-5EE9-419F-96EE-B6529EF6E7D0}"/>
+              </a:ext>
+              <a:ext uri="{C183D7F6-B498-43B3-948B-1728B52AA6E4}">
+                <adec:decorative xmlns:adec="http://schemas.microsoft.com/office/drawing/2017/decorative" val="1"/>
+              </a:ext>
+            </a:extLst>
+          </p:cNvPr>
+          <p:cNvSpPr>
+            <a:spLocks noGrp="1" noRot="1" noChangeAspect="1" noMove="1" noResize="1" noEditPoints="1" noAdjustHandles="1" noChangeArrowheads="1" noChangeShapeType="1" noTextEdit="1"/>
+          </p:cNvSpPr>
+          <p:nvPr>
+            <p:extLst>
+              <p:ext uri="{386F3935-93C4-4BCD-93E2-E3B085C9AB24}">
+                <p16:designElem xmlns:p16="http://schemas.microsoft.com/office/powerpoint/2015/main" val="1"/>
+              </p:ext>
+            </p:extLst>
+          </p:nvPr>
+        </p:nvSpPr>
+        <p:spPr>
+          <a:xfrm>
+            <a:off x="395893" y="2443480"/>
+            <a:ext cx="3383280" cy="18288"/>
+          </a:xfrm>
+          <a:prstGeom prst="rect">
+            <a:avLst/>
+          </a:prstGeom>
+          <a:solidFill>
+            <a:srgbClr val="D5D5D5"/>
+          </a:solidFill>
+          <a:ln w="3175">
+            <a:noFill/>
+          </a:ln>
+          <a:effectLst/>
+        </p:spPr>
+        <p:style>
+          <a:lnRef idx="2">
+            <a:schemeClr val="accent1">
+              <a:shade val="50000"/>
+            </a:schemeClr>
+          </a:lnRef>
+          <a:fillRef idx="1">
+            <a:schemeClr val="accent1"/>
+          </a:fillRef>
+          <a:effectRef idx="0">
+            <a:schemeClr val="accent1"/>
+          </a:effectRef>
+          <a:fontRef idx="minor">
+            <a:schemeClr val="lt1"/>
+          </a:fontRef>
+        </p:style>
+        <p:txBody>
+          <a:bodyPr rtlCol="0" anchor="ctr"/>
+          <a:lstStyle/>
+          <a:p>
+            <a:pPr marL="0" marR="0" lvl="0" indent="0" algn="ctr" defTabSz="914400" rtl="0" eaLnBrk="1" fontAlgn="auto" latinLnBrk="0" hangingPunct="1">
+              <a:lnSpc>
+                <a:spcPct val="100000"/>
+              </a:lnSpc>
+              <a:spcBef>
+                <a:spcPts val="0"/>
+              </a:spcBef>
+              <a:spcAft>
+                <a:spcPts val="0"/>
+              </a:spcAft>
+              <a:buClrTx/>
+              <a:buSzTx/>
+              <a:buFontTx/>
+              <a:buNone/>
+              <a:tabLst/>
+              <a:defRPr/>
+            </a:pPr>
+            <a:endParaRPr kumimoji="0" lang="en-US" sz="1800" b="0" i="0" u="none" strike="noStrike" kern="1200" cap="none" spc="0" normalizeH="0" baseline="0" noProof="0">
+              <a:ln>
+                <a:noFill/>
+              </a:ln>
+              <a:solidFill>
+                <a:prstClr val="white"/>
+              </a:solidFill>
+              <a:effectLst/>
+              <a:uLnTx/>
+              <a:uFillTx/>
+              <a:latin typeface="Calibri" panose="020F0502020204030204"/>
+              <a:ea typeface="+mn-ea"/>
+              <a:cs typeface="+mn-cs"/>
+            </a:endParaRPr>
+          </a:p>
+        </p:txBody>
+      </p:sp>
+      <p:sp>
+        <p:nvSpPr>
+          <p:cNvPr id="10" name="TextBox 9">
+            <a:extLst>
+              <a:ext uri="{FF2B5EF4-FFF2-40B4-BE49-F238E27FC236}">
+                <a16:creationId xmlns:a16="http://schemas.microsoft.com/office/drawing/2014/main" id="{7457A7ED-018C-F746-FCD3-68A9CA32B5FA}"/>
+              </a:ext>
+            </a:extLst>
+          </p:cNvPr>
+          <p:cNvSpPr txBox="1"/>
+          <p:nvPr/>
+        </p:nvSpPr>
+        <p:spPr>
+          <a:xfrm>
+            <a:off x="371094" y="2718054"/>
+            <a:ext cx="3438906" cy="3207258"/>
+          </a:xfrm>
+          <a:prstGeom prst="rect">
+            <a:avLst/>
+          </a:prstGeom>
+        </p:spPr>
+        <p:txBody>
+          <a:bodyPr vert="horz" lIns="91440" tIns="45720" rIns="91440" bIns="45720" rtlCol="0" anchor="t">
+            <a:normAutofit/>
+          </a:bodyPr>
+          <a:lstStyle/>
+          <a:p>
+            <a:pPr indent="-228600">
+              <a:lnSpc>
+                <a:spcPct val="90000"/>
+              </a:lnSpc>
+              <a:spcAft>
+                <a:spcPts val="600"/>
+              </a:spcAft>
+              <a:buFont typeface="Arial" panose="020B0604020202020204" pitchFamily="34" charset="0"/>
+              <a:buChar char="•"/>
+            </a:pPr>
+            <a:r>
+              <a:rPr lang="en-US" sz="1700"/>
+              <a:t>Train and Test split</a:t>
+            </a:r>
+          </a:p>
+        </p:txBody>
+      </p:sp>
+      <p:pic>
+        <p:nvPicPr>
+          <p:cNvPr id="9" name="Content Placeholder 8" descr="A screenshot of a computer&#10;&#10;AI-generated content may be incorrect.">
+            <a:extLst>
+              <a:ext uri="{FF2B5EF4-FFF2-40B4-BE49-F238E27FC236}">
+                <a16:creationId xmlns:a16="http://schemas.microsoft.com/office/drawing/2014/main" id="{99FE9694-6CD6-F793-77C6-41CECF229D48}"/>
+              </a:ext>
+            </a:extLst>
+          </p:cNvPr>
+          <p:cNvPicPr>
+            <a:picLocks noGrp="1" noChangeAspect="1"/>
+          </p:cNvPicPr>
+          <p:nvPr>
+            <p:ph idx="1"/>
+          </p:nvPr>
+        </p:nvPicPr>
+        <p:blipFill>
+          <a:blip r:embed="rId2"/>
+          <a:stretch>
+            <a:fillRect/>
+          </a:stretch>
+        </p:blipFill>
+        <p:spPr>
+          <a:xfrm>
+            <a:off x="4901184" y="1913187"/>
+            <a:ext cx="6894923" cy="3132209"/>
+          </a:xfrm>
+          <a:prstGeom prst="rect">
+            <a:avLst/>
+          </a:prstGeom>
+        </p:spPr>
+      </p:pic>
+    </p:spTree>
+    <p:extLst>
+      <p:ext uri="{BB962C8B-B14F-4D97-AF65-F5344CB8AC3E}">
+        <p14:creationId xmlns:p14="http://schemas.microsoft.com/office/powerpoint/2010/main" val="3664637242"/>
+      </p:ext>
+    </p:extLst>
+  </p:cSld>
+  <p:clrMapOvr>
+    <a:masterClrMapping/>
+  </p:clrMapOvr>
+</p:sld>
+</file>
+
+<file path=ppt/slides/slide12.xml><?xml version="1.0" encoding="utf-8"?>
+<p:sld xmlns:a="http://schemas.openxmlformats.org/drawingml/2006/main" xmlns:r="http://schemas.openxmlformats.org/officeDocument/2006/relationships" xmlns:p="http://schemas.openxmlformats.org/presentationml/2006/main">
+  <p:cSld>
+    <p:bg>
+      <p:bgPr>
+        <a:solidFill>
+          <a:schemeClr val="bg1"/>
+        </a:solidFill>
+        <a:effectLst/>
+      </p:bgPr>
+    </p:bg>
+    <p:spTree>
+      <p:nvGrpSpPr>
+        <p:cNvPr id="1" name=""/>
+        <p:cNvGrpSpPr/>
+        <p:nvPr/>
+      </p:nvGrpSpPr>
+      <p:grpSpPr>
+        <a:xfrm>
+          <a:off x="0" y="0"/>
+          <a:ext cx="0" cy="0"/>
+          <a:chOff x="0" y="0"/>
+          <a:chExt cx="0" cy="0"/>
+        </a:xfrm>
+      </p:grpSpPr>
+      <p:pic>
+        <p:nvPicPr>
+          <p:cNvPr id="5" name="Picture 4" descr="A screenshot of a computer&#10;&#10;AI-generated content may be incorrect.">
+            <a:extLst>
+              <a:ext uri="{FF2B5EF4-FFF2-40B4-BE49-F238E27FC236}">
+                <a16:creationId xmlns:a16="http://schemas.microsoft.com/office/drawing/2014/main" id="{84CBF625-685A-0821-1509-2271992E7330}"/>
+              </a:ext>
+            </a:extLst>
+          </p:cNvPr>
+          <p:cNvPicPr>
+            <a:picLocks noChangeAspect="1"/>
+          </p:cNvPicPr>
+          <p:nvPr/>
+        </p:nvPicPr>
+        <p:blipFill>
+          <a:blip r:embed="rId2"/>
+          <a:stretch>
+            <a:fillRect/>
+          </a:stretch>
+        </p:blipFill>
+        <p:spPr>
+          <a:xfrm>
+            <a:off x="643467" y="3271556"/>
+            <a:ext cx="10905066" cy="2998892"/>
+          </a:xfrm>
+          <a:prstGeom prst="rect">
+            <a:avLst/>
+          </a:prstGeom>
+        </p:spPr>
+      </p:pic>
+      <p:sp>
+        <p:nvSpPr>
+          <p:cNvPr id="7" name="TextBox 6">
+            <a:extLst>
+              <a:ext uri="{FF2B5EF4-FFF2-40B4-BE49-F238E27FC236}">
+                <a16:creationId xmlns:a16="http://schemas.microsoft.com/office/drawing/2014/main" id="{E5E85FBE-F037-7F0C-F140-CA3CDB8511CF}"/>
+              </a:ext>
+            </a:extLst>
+          </p:cNvPr>
+          <p:cNvSpPr txBox="1"/>
+          <p:nvPr/>
+        </p:nvSpPr>
+        <p:spPr>
+          <a:xfrm>
+            <a:off x="849184" y="548936"/>
+            <a:ext cx="1986441" cy="369332"/>
+          </a:xfrm>
+          <a:prstGeom prst="rect">
+            <a:avLst/>
+          </a:prstGeom>
+          <a:noFill/>
+        </p:spPr>
+        <p:txBody>
+          <a:bodyPr wrap="none" rtlCol="0">
+            <a:spAutoFit/>
+          </a:bodyPr>
+          <a:lstStyle/>
+          <a:p>
+            <a:r>
+              <a:rPr lang="en-US" dirty="0"/>
+              <a:t>One Hot Encoding</a:t>
+            </a:r>
+          </a:p>
+        </p:txBody>
+      </p:sp>
+      <p:graphicFrame>
+        <p:nvGraphicFramePr>
+          <p:cNvPr id="8" name="Table 7">
+            <a:extLst>
+              <a:ext uri="{FF2B5EF4-FFF2-40B4-BE49-F238E27FC236}">
+                <a16:creationId xmlns:a16="http://schemas.microsoft.com/office/drawing/2014/main" id="{60E2E59A-F64B-6D7A-4B35-3107E4DF394B}"/>
+              </a:ext>
+            </a:extLst>
+          </p:cNvPr>
+          <p:cNvGraphicFramePr>
+            <a:graphicFrameLocks noGrp="1"/>
+          </p:cNvGraphicFramePr>
+          <p:nvPr>
+            <p:extLst>
+              <p:ext uri="{D42A27DB-BD31-4B8C-83A1-F6EECF244321}">
+                <p14:modId xmlns:p14="http://schemas.microsoft.com/office/powerpoint/2010/main" val="1146703446"/>
+              </p:ext>
+            </p:extLst>
+          </p:nvPr>
+        </p:nvGraphicFramePr>
+        <p:xfrm>
+          <a:off x="5883189" y="1292479"/>
+          <a:ext cx="4439508" cy="828063"/>
+        </p:xfrm>
+        <a:graphic>
+          <a:graphicData uri="http://schemas.openxmlformats.org/drawingml/2006/table">
+            <a:tbl>
+              <a:tblPr>
+                <a:tableStyleId>{5C22544A-7EE6-4342-B048-85BDC9FD1C3A}</a:tableStyleId>
+              </a:tblPr>
+              <a:tblGrid>
+                <a:gridCol w="1109877">
+                  <a:extLst>
+                    <a:ext uri="{9D8B030D-6E8A-4147-A177-3AD203B41FA5}">
+                      <a16:colId xmlns:a16="http://schemas.microsoft.com/office/drawing/2014/main" val="2608035959"/>
+                    </a:ext>
+                  </a:extLst>
+                </a:gridCol>
+                <a:gridCol w="1109877">
+                  <a:extLst>
+                    <a:ext uri="{9D8B030D-6E8A-4147-A177-3AD203B41FA5}">
+                      <a16:colId xmlns:a16="http://schemas.microsoft.com/office/drawing/2014/main" val="3115237483"/>
+                    </a:ext>
+                  </a:extLst>
+                </a:gridCol>
+                <a:gridCol w="1109877">
+                  <a:extLst>
+                    <a:ext uri="{9D8B030D-6E8A-4147-A177-3AD203B41FA5}">
+                      <a16:colId xmlns:a16="http://schemas.microsoft.com/office/drawing/2014/main" val="2695950630"/>
+                    </a:ext>
+                  </a:extLst>
+                </a:gridCol>
+                <a:gridCol w="1109877">
+                  <a:extLst>
+                    <a:ext uri="{9D8B030D-6E8A-4147-A177-3AD203B41FA5}">
+                      <a16:colId xmlns:a16="http://schemas.microsoft.com/office/drawing/2014/main" val="2300693444"/>
+                    </a:ext>
+                  </a:extLst>
+                </a:gridCol>
+              </a:tblGrid>
+              <a:tr h="276021">
+                <a:tc>
+                  <a:txBody>
+                    <a:bodyPr/>
+                    <a:lstStyle/>
+                    <a:p>
+                      <a:pPr algn="l" fontAlgn="b"/>
+                      <a:r>
+                        <a:rPr lang="en-IN" sz="1200" u="none" strike="noStrike">
+                          <a:effectLst/>
+                        </a:rPr>
+                        <a:t>House Free</a:t>
+                      </a:r>
+                      <a:endParaRPr lang="en-IN" sz="1200" b="0" i="0" u="none" strike="noStrike">
+                        <a:solidFill>
+                          <a:srgbClr val="000000"/>
+                        </a:solidFill>
+                        <a:effectLst/>
+                        <a:latin typeface="Aptos Narrow" panose="020B0004020202020204" pitchFamily="34" charset="0"/>
+                      </a:endParaRPr>
+                    </a:p>
+                  </a:txBody>
+                  <a:tcPr marL="0" marR="0" marT="0" marB="0" anchor="b"/>
+                </a:tc>
+                <a:tc>
+                  <a:txBody>
+                    <a:bodyPr/>
+                    <a:lstStyle/>
+                    <a:p>
+                      <a:pPr algn="r" fontAlgn="b"/>
+                      <a:r>
+                        <a:rPr lang="en-IN" sz="1200" u="none" strike="noStrike" dirty="0">
+                          <a:effectLst/>
+                        </a:rPr>
+                        <a:t>1</a:t>
+                      </a:r>
+                      <a:endParaRPr lang="en-IN" sz="1200" b="0" i="0" u="none" strike="noStrike" dirty="0">
+                        <a:solidFill>
+                          <a:srgbClr val="000000"/>
+                        </a:solidFill>
+                        <a:effectLst/>
+                        <a:latin typeface="Aptos Narrow" panose="020B0004020202020204" pitchFamily="34" charset="0"/>
+                      </a:endParaRPr>
+                    </a:p>
+                  </a:txBody>
+                  <a:tcPr marL="0" marR="0" marT="0" marB="0" anchor="b"/>
+                </a:tc>
+                <a:tc>
+                  <a:txBody>
+                    <a:bodyPr/>
+                    <a:lstStyle/>
+                    <a:p>
+                      <a:pPr algn="r" fontAlgn="b"/>
+                      <a:r>
+                        <a:rPr lang="en-IN" sz="1200" u="none" strike="noStrike">
+                          <a:effectLst/>
+                        </a:rPr>
+                        <a:t>0</a:t>
+                      </a:r>
+                      <a:endParaRPr lang="en-IN" sz="1200" b="0" i="0" u="none" strike="noStrike">
+                        <a:solidFill>
+                          <a:srgbClr val="000000"/>
+                        </a:solidFill>
+                        <a:effectLst/>
+                        <a:latin typeface="Aptos Narrow" panose="020B0004020202020204" pitchFamily="34" charset="0"/>
+                      </a:endParaRPr>
+                    </a:p>
+                  </a:txBody>
+                  <a:tcPr marL="0" marR="0" marT="0" marB="0" anchor="b"/>
+                </a:tc>
+                <a:tc>
+                  <a:txBody>
+                    <a:bodyPr/>
+                    <a:lstStyle/>
+                    <a:p>
+                      <a:pPr algn="r" fontAlgn="b"/>
+                      <a:r>
+                        <a:rPr lang="en-IN" sz="1200" u="none" strike="noStrike">
+                          <a:effectLst/>
+                        </a:rPr>
+                        <a:t>0</a:t>
+                      </a:r>
+                      <a:endParaRPr lang="en-IN" sz="1200" b="0" i="0" u="none" strike="noStrike">
+                        <a:solidFill>
+                          <a:srgbClr val="000000"/>
+                        </a:solidFill>
+                        <a:effectLst/>
+                        <a:latin typeface="Aptos Narrow" panose="020B0004020202020204" pitchFamily="34" charset="0"/>
+                      </a:endParaRPr>
+                    </a:p>
+                  </a:txBody>
+                  <a:tcPr marL="0" marR="0" marT="0" marB="0" anchor="b"/>
+                </a:tc>
+                <a:extLst>
+                  <a:ext uri="{0D108BD9-81ED-4DB2-BD59-A6C34878D82A}">
+                    <a16:rowId xmlns:a16="http://schemas.microsoft.com/office/drawing/2014/main" val="388678792"/>
+                  </a:ext>
+                </a:extLst>
+              </a:tr>
+              <a:tr h="276021">
+                <a:tc>
+                  <a:txBody>
+                    <a:bodyPr/>
+                    <a:lstStyle/>
+                    <a:p>
+                      <a:pPr algn="l" fontAlgn="b"/>
+                      <a:r>
+                        <a:rPr lang="en-IN" sz="1200" u="none" strike="noStrike">
+                          <a:effectLst/>
+                        </a:rPr>
+                        <a:t>House Rent</a:t>
+                      </a:r>
+                      <a:endParaRPr lang="en-IN" sz="1200" b="0" i="0" u="none" strike="noStrike">
+                        <a:solidFill>
+                          <a:srgbClr val="000000"/>
+                        </a:solidFill>
+                        <a:effectLst/>
+                        <a:latin typeface="Aptos Narrow" panose="020B0004020202020204" pitchFamily="34" charset="0"/>
+                      </a:endParaRPr>
+                    </a:p>
+                  </a:txBody>
+                  <a:tcPr marL="0" marR="0" marT="0" marB="0" anchor="b"/>
+                </a:tc>
+                <a:tc>
+                  <a:txBody>
+                    <a:bodyPr/>
+                    <a:lstStyle/>
+                    <a:p>
+                      <a:pPr algn="r" fontAlgn="b"/>
+                      <a:r>
+                        <a:rPr lang="en-IN" sz="1200" u="none" strike="noStrike">
+                          <a:effectLst/>
+                        </a:rPr>
+                        <a:t>0</a:t>
+                      </a:r>
+                      <a:endParaRPr lang="en-IN" sz="1200" b="0" i="0" u="none" strike="noStrike">
+                        <a:solidFill>
+                          <a:srgbClr val="000000"/>
+                        </a:solidFill>
+                        <a:effectLst/>
+                        <a:latin typeface="Aptos Narrow" panose="020B0004020202020204" pitchFamily="34" charset="0"/>
+                      </a:endParaRPr>
+                    </a:p>
+                  </a:txBody>
+                  <a:tcPr marL="0" marR="0" marT="0" marB="0" anchor="b"/>
+                </a:tc>
+                <a:tc>
+                  <a:txBody>
+                    <a:bodyPr/>
+                    <a:lstStyle/>
+                    <a:p>
+                      <a:pPr algn="r" fontAlgn="b"/>
+                      <a:r>
+                        <a:rPr lang="en-IN" sz="1200" u="none" strike="noStrike">
+                          <a:effectLst/>
+                        </a:rPr>
+                        <a:t>1</a:t>
+                      </a:r>
+                      <a:endParaRPr lang="en-IN" sz="1200" b="0" i="0" u="none" strike="noStrike">
+                        <a:solidFill>
+                          <a:srgbClr val="000000"/>
+                        </a:solidFill>
+                        <a:effectLst/>
+                        <a:latin typeface="Aptos Narrow" panose="020B0004020202020204" pitchFamily="34" charset="0"/>
+                      </a:endParaRPr>
+                    </a:p>
+                  </a:txBody>
+                  <a:tcPr marL="0" marR="0" marT="0" marB="0" anchor="b"/>
+                </a:tc>
+                <a:tc>
+                  <a:txBody>
+                    <a:bodyPr/>
+                    <a:lstStyle/>
+                    <a:p>
+                      <a:pPr algn="r" fontAlgn="b"/>
+                      <a:r>
+                        <a:rPr lang="en-IN" sz="1200" u="none" strike="noStrike">
+                          <a:effectLst/>
+                        </a:rPr>
+                        <a:t>0</a:t>
+                      </a:r>
+                      <a:endParaRPr lang="en-IN" sz="1200" b="0" i="0" u="none" strike="noStrike">
+                        <a:solidFill>
+                          <a:srgbClr val="000000"/>
+                        </a:solidFill>
+                        <a:effectLst/>
+                        <a:latin typeface="Aptos Narrow" panose="020B0004020202020204" pitchFamily="34" charset="0"/>
+                      </a:endParaRPr>
+                    </a:p>
+                  </a:txBody>
+                  <a:tcPr marL="0" marR="0" marT="0" marB="0" anchor="b"/>
+                </a:tc>
+                <a:extLst>
+                  <a:ext uri="{0D108BD9-81ED-4DB2-BD59-A6C34878D82A}">
+                    <a16:rowId xmlns:a16="http://schemas.microsoft.com/office/drawing/2014/main" val="2216075531"/>
+                  </a:ext>
+                </a:extLst>
+              </a:tr>
+              <a:tr h="276021">
+                <a:tc>
+                  <a:txBody>
+                    <a:bodyPr/>
+                    <a:lstStyle/>
+                    <a:p>
+                      <a:pPr algn="l" fontAlgn="b"/>
+                      <a:r>
+                        <a:rPr lang="en-IN" sz="1200" u="none" strike="noStrike">
+                          <a:effectLst/>
+                        </a:rPr>
+                        <a:t>House Own</a:t>
+                      </a:r>
+                      <a:endParaRPr lang="en-IN" sz="1200" b="0" i="0" u="none" strike="noStrike">
+                        <a:solidFill>
+                          <a:srgbClr val="000000"/>
+                        </a:solidFill>
+                        <a:effectLst/>
+                        <a:latin typeface="Aptos Narrow" panose="020B0004020202020204" pitchFamily="34" charset="0"/>
+                      </a:endParaRPr>
+                    </a:p>
+                  </a:txBody>
+                  <a:tcPr marL="0" marR="0" marT="0" marB="0" anchor="b"/>
+                </a:tc>
+                <a:tc>
+                  <a:txBody>
+                    <a:bodyPr/>
+                    <a:lstStyle/>
+                    <a:p>
+                      <a:pPr algn="r" fontAlgn="b"/>
+                      <a:r>
+                        <a:rPr lang="en-IN" sz="1200" u="none" strike="noStrike">
+                          <a:effectLst/>
+                        </a:rPr>
+                        <a:t>0</a:t>
+                      </a:r>
+                      <a:endParaRPr lang="en-IN" sz="1200" b="0" i="0" u="none" strike="noStrike">
+                        <a:solidFill>
+                          <a:srgbClr val="000000"/>
+                        </a:solidFill>
+                        <a:effectLst/>
+                        <a:latin typeface="Aptos Narrow" panose="020B0004020202020204" pitchFamily="34" charset="0"/>
+                      </a:endParaRPr>
+                    </a:p>
+                  </a:txBody>
+                  <a:tcPr marL="0" marR="0" marT="0" marB="0" anchor="b"/>
+                </a:tc>
+                <a:tc>
+                  <a:txBody>
+                    <a:bodyPr/>
+                    <a:lstStyle/>
+                    <a:p>
+                      <a:pPr algn="r" fontAlgn="b"/>
+                      <a:r>
+                        <a:rPr lang="en-IN" sz="1200" u="none" strike="noStrike">
+                          <a:effectLst/>
+                        </a:rPr>
+                        <a:t>0</a:t>
+                      </a:r>
+                      <a:endParaRPr lang="en-IN" sz="1200" b="0" i="0" u="none" strike="noStrike">
+                        <a:solidFill>
+                          <a:srgbClr val="000000"/>
+                        </a:solidFill>
+                        <a:effectLst/>
+                        <a:latin typeface="Aptos Narrow" panose="020B0004020202020204" pitchFamily="34" charset="0"/>
+                      </a:endParaRPr>
+                    </a:p>
+                  </a:txBody>
+                  <a:tcPr marL="0" marR="0" marT="0" marB="0" anchor="b"/>
+                </a:tc>
+                <a:tc>
+                  <a:txBody>
+                    <a:bodyPr/>
+                    <a:lstStyle/>
+                    <a:p>
+                      <a:pPr algn="r" fontAlgn="b"/>
+                      <a:r>
+                        <a:rPr lang="en-IN" sz="1200" u="none" strike="noStrike" dirty="0">
+                          <a:effectLst/>
+                        </a:rPr>
+                        <a:t>1</a:t>
+                      </a:r>
+                      <a:endParaRPr lang="en-IN" sz="1200" b="0" i="0" u="none" strike="noStrike" dirty="0">
+                        <a:solidFill>
+                          <a:srgbClr val="000000"/>
+                        </a:solidFill>
+                        <a:effectLst/>
+                        <a:latin typeface="Aptos Narrow" panose="020B0004020202020204" pitchFamily="34" charset="0"/>
+                      </a:endParaRPr>
+                    </a:p>
+                  </a:txBody>
+                  <a:tcPr marL="0" marR="0" marT="0" marB="0" anchor="b"/>
+                </a:tc>
+                <a:extLst>
+                  <a:ext uri="{0D108BD9-81ED-4DB2-BD59-A6C34878D82A}">
+                    <a16:rowId xmlns:a16="http://schemas.microsoft.com/office/drawing/2014/main" val="3430749123"/>
+                  </a:ext>
+                </a:extLst>
+              </a:tr>
+            </a:tbl>
+          </a:graphicData>
+        </a:graphic>
+      </p:graphicFrame>
+      <p:sp>
+        <p:nvSpPr>
+          <p:cNvPr id="9" name="TextBox 8">
+            <a:extLst>
+              <a:ext uri="{FF2B5EF4-FFF2-40B4-BE49-F238E27FC236}">
+                <a16:creationId xmlns:a16="http://schemas.microsoft.com/office/drawing/2014/main" id="{27E4A8CE-251C-FAE5-FD4A-F5CBA65AD5AD}"/>
+              </a:ext>
+            </a:extLst>
+          </p:cNvPr>
+          <p:cNvSpPr txBox="1"/>
+          <p:nvPr/>
+        </p:nvSpPr>
+        <p:spPr>
+          <a:xfrm>
+            <a:off x="939114" y="1238499"/>
+            <a:ext cx="3348681" cy="646331"/>
+          </a:xfrm>
+          <a:prstGeom prst="rect">
+            <a:avLst/>
+          </a:prstGeom>
+          <a:noFill/>
+        </p:spPr>
+        <p:txBody>
+          <a:bodyPr wrap="square" rtlCol="0">
+            <a:spAutoFit/>
+          </a:bodyPr>
+          <a:lstStyle/>
+          <a:p>
+            <a:r>
+              <a:rPr lang="en-US" dirty="0"/>
+              <a:t>One hot encoding binarizes the categorical classes</a:t>
+            </a:r>
+          </a:p>
+        </p:txBody>
+      </p:sp>
+    </p:spTree>
+    <p:extLst>
+      <p:ext uri="{BB962C8B-B14F-4D97-AF65-F5344CB8AC3E}">
+        <p14:creationId xmlns:p14="http://schemas.microsoft.com/office/powerpoint/2010/main" val="4183114075"/>
       </p:ext>
     </p:extLst>
   </p:cSld>
@@ -9613,10 +10784,10 @@
       </p:grpSpPr>
       <p:sp useBgFill="1">
         <p:nvSpPr>
-          <p:cNvPr id="30" name="Rectangle 29">
+          <p:cNvPr id="36" name="Rectangle 35">
             <a:extLst>
               <a:ext uri="{FF2B5EF4-FFF2-40B4-BE49-F238E27FC236}">
-                <a16:creationId xmlns:a16="http://schemas.microsoft.com/office/drawing/2014/main" id="{23E547B5-89CF-4EC0-96DE-25771AED0799}"/>
+                <a16:creationId xmlns:a16="http://schemas.microsoft.com/office/drawing/2014/main" id="{131BAD53-4E89-4F62-BBB7-26359763ED39}"/>
               </a:ext>
               <a:ext uri="{C183D7F6-B498-43B3-948B-1728B52AA6E4}">
                 <adec:decorative xmlns:adec="http://schemas.microsoft.com/office/drawing/2017/decorative" val="1"/>
@@ -9689,10 +10860,10 @@
       </p:sp>
       <p:sp>
         <p:nvSpPr>
-          <p:cNvPr id="31" name="Rectangle 30">
+          <p:cNvPr id="38" name="Freeform: Shape 37">
             <a:extLst>
               <a:ext uri="{FF2B5EF4-FFF2-40B4-BE49-F238E27FC236}">
-                <a16:creationId xmlns:a16="http://schemas.microsoft.com/office/drawing/2014/main" id="{3F0B8CEB-8279-4E5E-A0CE-1FC9F71736F2}"/>
+                <a16:creationId xmlns:a16="http://schemas.microsoft.com/office/drawing/2014/main" id="{62756DA2-40EB-4C6F-B962-5822FFB54FB6}"/>
               </a:ext>
               <a:ext uri="{C183D7F6-B498-43B3-948B-1728B52AA6E4}">
                 <adec:decorative xmlns:adec="http://schemas.microsoft.com/office/drawing/2017/decorative" val="1"/>
@@ -9712,12 +10883,1483 @@
         </p:nvSpPr>
         <p:spPr>
           <a:xfrm>
-            <a:off x="4770782" y="0"/>
-            <a:ext cx="7421217" cy="6857999"/>
+            <a:off x="0" y="0"/>
+            <a:ext cx="5653438" cy="6858000"/>
           </a:xfrm>
-          <a:prstGeom prst="rect">
+          <a:custGeom>
             <a:avLst/>
-          </a:prstGeom>
+            <a:gdLst>
+              <a:gd name="connsiteX0" fmla="*/ 0 w 6096000"/>
+              <a:gd name="connsiteY0" fmla="*/ 0 h 6858000"/>
+              <a:gd name="connsiteX1" fmla="*/ 5567517 w 6096000"/>
+              <a:gd name="connsiteY1" fmla="*/ 0 h 6858000"/>
+              <a:gd name="connsiteX2" fmla="*/ 5566938 w 6096000"/>
+              <a:gd name="connsiteY2" fmla="*/ 1705 h 6858000"/>
+              <a:gd name="connsiteX3" fmla="*/ 5551594 w 6096000"/>
+              <a:gd name="connsiteY3" fmla="*/ 17287 h 6858000"/>
+              <a:gd name="connsiteX4" fmla="*/ 5545641 w 6096000"/>
+              <a:gd name="connsiteY4" fmla="*/ 130336 h 6858000"/>
+              <a:gd name="connsiteX5" fmla="*/ 5538289 w 6096000"/>
+              <a:gd name="connsiteY5" fmla="*/ 187093 h 6858000"/>
+              <a:gd name="connsiteX6" fmla="*/ 5545790 w 6096000"/>
+              <a:gd name="connsiteY6" fmla="*/ 265704 h 6858000"/>
+              <a:gd name="connsiteX7" fmla="*/ 5542313 w 6096000"/>
+              <a:gd name="connsiteY7" fmla="*/ 354566 h 6858000"/>
+              <a:gd name="connsiteX8" fmla="*/ 5524126 w 6096000"/>
+              <a:gd name="connsiteY8" fmla="*/ 472000 h 6858000"/>
+              <a:gd name="connsiteX9" fmla="*/ 5522170 w 6096000"/>
+              <a:gd name="connsiteY9" fmla="*/ 473782 h 6858000"/>
+              <a:gd name="connsiteX10" fmla="*/ 5521798 w 6096000"/>
+              <a:gd name="connsiteY10" fmla="*/ 491380 h 6858000"/>
+              <a:gd name="connsiteX11" fmla="*/ 5536419 w 6096000"/>
+              <a:gd name="connsiteY11" fmla="*/ 531675 h 6858000"/>
+              <a:gd name="connsiteX12" fmla="*/ 5533435 w 6096000"/>
+              <a:gd name="connsiteY12" fmla="*/ 536015 h 6858000"/>
+              <a:gd name="connsiteX13" fmla="*/ 5538088 w 6096000"/>
+              <a:gd name="connsiteY13" fmla="*/ 572092 h 6858000"/>
+              <a:gd name="connsiteX14" fmla="*/ 5536061 w 6096000"/>
+              <a:gd name="connsiteY14" fmla="*/ 572511 h 6858000"/>
+              <a:gd name="connsiteX15" fmla="*/ 5528218 w 6096000"/>
+              <a:gd name="connsiteY15" fmla="*/ 582332 h 6858000"/>
+              <a:gd name="connsiteX16" fmla="*/ 5518011 w 6096000"/>
+              <a:gd name="connsiteY16" fmla="*/ 601285 h 6858000"/>
+              <a:gd name="connsiteX17" fmla="*/ 5473174 w 6096000"/>
+              <a:gd name="connsiteY17" fmla="*/ 681608 h 6858000"/>
+              <a:gd name="connsiteX18" fmla="*/ 5472963 w 6096000"/>
+              <a:gd name="connsiteY18" fmla="*/ 689151 h 6858000"/>
+              <a:gd name="connsiteX19" fmla="*/ 5472485 w 6096000"/>
+              <a:gd name="connsiteY19" fmla="*/ 689289 h 6858000"/>
+              <a:gd name="connsiteX20" fmla="*/ 5471326 w 6096000"/>
+              <a:gd name="connsiteY20" fmla="*/ 697222 h 6858000"/>
+              <a:gd name="connsiteX21" fmla="*/ 5472164 w 6096000"/>
+              <a:gd name="connsiteY21" fmla="*/ 717531 h 6858000"/>
+              <a:gd name="connsiteX22" fmla="*/ 5468891 w 6096000"/>
+              <a:gd name="connsiteY22" fmla="*/ 722494 h 6858000"/>
+              <a:gd name="connsiteX23" fmla="*/ 5463081 w 6096000"/>
+              <a:gd name="connsiteY23" fmla="*/ 724368 h 6858000"/>
+              <a:gd name="connsiteX24" fmla="*/ 5446981 w 6096000"/>
+              <a:gd name="connsiteY24" fmla="*/ 752692 h 6858000"/>
+              <a:gd name="connsiteX25" fmla="*/ 5417190 w 6096000"/>
+              <a:gd name="connsiteY25" fmla="*/ 816346 h 6858000"/>
+              <a:gd name="connsiteX26" fmla="*/ 5388958 w 6096000"/>
+              <a:gd name="connsiteY26" fmla="*/ 889417 h 6858000"/>
+              <a:gd name="connsiteX27" fmla="*/ 5307044 w 6096000"/>
+              <a:gd name="connsiteY27" fmla="*/ 1063288 h 6858000"/>
+              <a:gd name="connsiteX28" fmla="*/ 5303837 w 6096000"/>
+              <a:gd name="connsiteY28" fmla="*/ 1157176 h 6858000"/>
+              <a:gd name="connsiteX29" fmla="*/ 5286494 w 6096000"/>
+              <a:gd name="connsiteY29" fmla="*/ 1210776 h 6858000"/>
+              <a:gd name="connsiteX30" fmla="*/ 5282463 w 6096000"/>
+              <a:gd name="connsiteY30" fmla="*/ 1301993 h 6858000"/>
+              <a:gd name="connsiteX31" fmla="*/ 5252235 w 6096000"/>
+              <a:gd name="connsiteY31" fmla="*/ 1360879 h 6858000"/>
+              <a:gd name="connsiteX32" fmla="*/ 5244497 w 6096000"/>
+              <a:gd name="connsiteY32" fmla="*/ 1404045 h 6858000"/>
+              <a:gd name="connsiteX33" fmla="*/ 5223823 w 6096000"/>
+              <a:gd name="connsiteY33" fmla="*/ 1429568 h 6858000"/>
+              <a:gd name="connsiteX34" fmla="*/ 5224851 w 6096000"/>
+              <a:gd name="connsiteY34" fmla="*/ 1430305 h 6858000"/>
+              <a:gd name="connsiteX35" fmla="*/ 5212394 w 6096000"/>
+              <a:gd name="connsiteY35" fmla="*/ 1463304 h 6858000"/>
+              <a:gd name="connsiteX36" fmla="*/ 5209958 w 6096000"/>
+              <a:gd name="connsiteY36" fmla="*/ 1514846 h 6858000"/>
+              <a:gd name="connsiteX37" fmla="*/ 5206417 w 6096000"/>
+              <a:gd name="connsiteY37" fmla="*/ 1519731 h 6858000"/>
+              <a:gd name="connsiteX38" fmla="*/ 5206640 w 6096000"/>
+              <a:gd name="connsiteY38" fmla="*/ 1519929 h 6858000"/>
+              <a:gd name="connsiteX39" fmla="*/ 5207632 w 6096000"/>
+              <a:gd name="connsiteY39" fmla="*/ 1546022 h 6858000"/>
+              <a:gd name="connsiteX40" fmla="*/ 5212030 w 6096000"/>
+              <a:gd name="connsiteY40" fmla="*/ 1578752 h 6858000"/>
+              <a:gd name="connsiteX41" fmla="*/ 5203533 w 6096000"/>
+              <a:gd name="connsiteY41" fmla="*/ 1647555 h 6858000"/>
+              <a:gd name="connsiteX42" fmla="*/ 5190877 w 6096000"/>
+              <a:gd name="connsiteY42" fmla="*/ 1715685 h 6858000"/>
+              <a:gd name="connsiteX43" fmla="*/ 5184235 w 6096000"/>
+              <a:gd name="connsiteY43" fmla="*/ 1740358 h 6858000"/>
+              <a:gd name="connsiteX44" fmla="*/ 5181475 w 6096000"/>
+              <a:gd name="connsiteY44" fmla="*/ 1784314 h 6858000"/>
+              <a:gd name="connsiteX45" fmla="*/ 5185845 w 6096000"/>
+              <a:gd name="connsiteY45" fmla="*/ 1804434 h 6858000"/>
+              <a:gd name="connsiteX46" fmla="*/ 5185068 w 6096000"/>
+              <a:gd name="connsiteY46" fmla="*/ 1805316 h 6858000"/>
+              <a:gd name="connsiteX47" fmla="*/ 5188593 w 6096000"/>
+              <a:gd name="connsiteY47" fmla="*/ 1807109 h 6858000"/>
+              <a:gd name="connsiteX48" fmla="*/ 5185920 w 6096000"/>
+              <a:gd name="connsiteY48" fmla="*/ 1821003 h 6858000"/>
+              <a:gd name="connsiteX49" fmla="*/ 5183543 w 6096000"/>
+              <a:gd name="connsiteY49" fmla="*/ 1824832 h 6858000"/>
+              <a:gd name="connsiteX50" fmla="*/ 5182235 w 6096000"/>
+              <a:gd name="connsiteY50" fmla="*/ 1830429 h 6858000"/>
+              <a:gd name="connsiteX51" fmla="*/ 5182525 w 6096000"/>
+              <a:gd name="connsiteY51" fmla="*/ 1830569 h 6858000"/>
+              <a:gd name="connsiteX52" fmla="*/ 5180663 w 6096000"/>
+              <a:gd name="connsiteY52" fmla="*/ 1835810 h 6858000"/>
+              <a:gd name="connsiteX53" fmla="*/ 5167452 w 6096000"/>
+              <a:gd name="connsiteY53" fmla="*/ 1861483 h 6858000"/>
+              <a:gd name="connsiteX54" fmla="*/ 5174266 w 6096000"/>
+              <a:gd name="connsiteY54" fmla="*/ 1892417 h 6858000"/>
+              <a:gd name="connsiteX55" fmla="*/ 5189262 w 6096000"/>
+              <a:gd name="connsiteY55" fmla="*/ 1895114 h 6858000"/>
+              <a:gd name="connsiteX56" fmla="*/ 5187100 w 6096000"/>
+              <a:gd name="connsiteY56" fmla="*/ 1899379 h 6858000"/>
+              <a:gd name="connsiteX57" fmla="*/ 5180471 w 6096000"/>
+              <a:gd name="connsiteY57" fmla="*/ 1907867 h 6858000"/>
+              <a:gd name="connsiteX58" fmla="*/ 5181361 w 6096000"/>
+              <a:gd name="connsiteY58" fmla="*/ 1910265 h 6858000"/>
+              <a:gd name="connsiteX59" fmla="*/ 5178268 w 6096000"/>
+              <a:gd name="connsiteY59" fmla="*/ 1935584 h 6858000"/>
+              <a:gd name="connsiteX60" fmla="*/ 5183619 w 6096000"/>
+              <a:gd name="connsiteY60" fmla="*/ 1942021 h 6858000"/>
+              <a:gd name="connsiteX61" fmla="*/ 5184480 w 6096000"/>
+              <a:gd name="connsiteY61" fmla="*/ 1945112 h 6858000"/>
+              <a:gd name="connsiteX62" fmla="*/ 5172776 w 6096000"/>
+              <a:gd name="connsiteY62" fmla="*/ 1961162 h 6858000"/>
+              <a:gd name="connsiteX63" fmla="*/ 5168513 w 6096000"/>
+              <a:gd name="connsiteY63" fmla="*/ 1969445 h 6858000"/>
+              <a:gd name="connsiteX64" fmla="*/ 5126597 w 6096000"/>
+              <a:gd name="connsiteY64" fmla="*/ 2024270 h 6858000"/>
+              <a:gd name="connsiteX65" fmla="*/ 5119528 w 6096000"/>
+              <a:gd name="connsiteY65" fmla="*/ 2107942 h 6858000"/>
+              <a:gd name="connsiteX66" fmla="*/ 5110356 w 6096000"/>
+              <a:gd name="connsiteY66" fmla="*/ 2193455 h 6858000"/>
+              <a:gd name="connsiteX67" fmla="*/ 5104992 w 6096000"/>
+              <a:gd name="connsiteY67" fmla="*/ 2260088 h 6858000"/>
+              <a:gd name="connsiteX68" fmla="*/ 5059439 w 6096000"/>
+              <a:gd name="connsiteY68" fmla="*/ 2335735 h 6858000"/>
+              <a:gd name="connsiteX69" fmla="*/ 5022061 w 6096000"/>
+              <a:gd name="connsiteY69" fmla="*/ 2408995 h 6858000"/>
+              <a:gd name="connsiteX70" fmla="*/ 5022253 w 6096000"/>
+              <a:gd name="connsiteY70" fmla="*/ 2445869 h 6858000"/>
+              <a:gd name="connsiteX71" fmla="*/ 5011426 w 6096000"/>
+              <a:gd name="connsiteY71" fmla="*/ 2496499 h 6858000"/>
+              <a:gd name="connsiteX72" fmla="*/ 4994224 w 6096000"/>
+              <a:gd name="connsiteY72" fmla="*/ 2549900 h 6858000"/>
+              <a:gd name="connsiteX73" fmla="*/ 4995245 w 6096000"/>
+              <a:gd name="connsiteY73" fmla="*/ 2596456 h 6858000"/>
+              <a:gd name="connsiteX74" fmla="*/ 4988570 w 6096000"/>
+              <a:gd name="connsiteY74" fmla="*/ 2606088 h 6858000"/>
+              <a:gd name="connsiteX75" fmla="*/ 4988371 w 6096000"/>
+              <a:gd name="connsiteY75" fmla="*/ 2635351 h 6858000"/>
+              <a:gd name="connsiteX76" fmla="*/ 4983212 w 6096000"/>
+              <a:gd name="connsiteY76" fmla="*/ 2665666 h 6858000"/>
+              <a:gd name="connsiteX77" fmla="*/ 4968234 w 6096000"/>
+              <a:gd name="connsiteY77" fmla="*/ 2715895 h 6858000"/>
+              <a:gd name="connsiteX78" fmla="*/ 4975888 w 6096000"/>
+              <a:gd name="connsiteY78" fmla="*/ 2725052 h 6858000"/>
+              <a:gd name="connsiteX79" fmla="*/ 4980195 w 6096000"/>
+              <a:gd name="connsiteY79" fmla="*/ 2726489 h 6858000"/>
+              <a:gd name="connsiteX80" fmla="*/ 4976218 w 6096000"/>
+              <a:gd name="connsiteY80" fmla="*/ 2740278 h 6858000"/>
+              <a:gd name="connsiteX81" fmla="*/ 4980571 w 6096000"/>
+              <a:gd name="connsiteY81" fmla="*/ 2751112 h 6858000"/>
+              <a:gd name="connsiteX82" fmla="*/ 4973893 w 6096000"/>
+              <a:gd name="connsiteY82" fmla="*/ 2760208 h 6858000"/>
+              <a:gd name="connsiteX83" fmla="*/ 4979005 w 6096000"/>
+              <a:gd name="connsiteY83" fmla="*/ 2790136 h 6858000"/>
+              <a:gd name="connsiteX84" fmla="*/ 4986137 w 6096000"/>
+              <a:gd name="connsiteY84" fmla="*/ 2804183 h 6858000"/>
+              <a:gd name="connsiteX85" fmla="*/ 4986175 w 6096000"/>
+              <a:gd name="connsiteY85" fmla="*/ 2825860 h 6858000"/>
+              <a:gd name="connsiteX86" fmla="*/ 4993936 w 6096000"/>
+              <a:gd name="connsiteY86" fmla="*/ 2911749 h 6858000"/>
+              <a:gd name="connsiteX87" fmla="*/ 4992563 w 6096000"/>
+              <a:gd name="connsiteY87" fmla="*/ 2977278 h 6858000"/>
+              <a:gd name="connsiteX88" fmla="*/ 4980516 w 6096000"/>
+              <a:gd name="connsiteY88" fmla="*/ 2991092 h 6858000"/>
+              <a:gd name="connsiteX89" fmla="*/ 4992801 w 6096000"/>
+              <a:gd name="connsiteY89" fmla="*/ 3020247 h 6858000"/>
+              <a:gd name="connsiteX90" fmla="*/ 5014805 w 6096000"/>
+              <a:gd name="connsiteY90" fmla="*/ 3065434 h 6858000"/>
+              <a:gd name="connsiteX91" fmla="*/ 5002733 w 6096000"/>
+              <a:gd name="connsiteY91" fmla="*/ 3103777 h 6858000"/>
+              <a:gd name="connsiteX92" fmla="*/ 5002941 w 6096000"/>
+              <a:gd name="connsiteY92" fmla="*/ 3151828 h 6858000"/>
+              <a:gd name="connsiteX93" fmla="*/ 5002883 w 6096000"/>
+              <a:gd name="connsiteY93" fmla="*/ 3180546 h 6858000"/>
+              <a:gd name="connsiteX94" fmla="*/ 5016711 w 6096000"/>
+              <a:gd name="connsiteY94" fmla="*/ 3258677 h 6858000"/>
+              <a:gd name="connsiteX95" fmla="*/ 5017918 w 6096000"/>
+              <a:gd name="connsiteY95" fmla="*/ 3262610 h 6858000"/>
+              <a:gd name="connsiteX96" fmla="*/ 5011672 w 6096000"/>
+              <a:gd name="connsiteY96" fmla="*/ 3277179 h 6858000"/>
+              <a:gd name="connsiteX97" fmla="*/ 5009344 w 6096000"/>
+              <a:gd name="connsiteY97" fmla="*/ 3278130 h 6858000"/>
+              <a:gd name="connsiteX98" fmla="*/ 5026770 w 6096000"/>
+              <a:gd name="connsiteY98" fmla="*/ 3325671 h 6858000"/>
+              <a:gd name="connsiteX99" fmla="*/ 5024571 w 6096000"/>
+              <a:gd name="connsiteY99" fmla="*/ 3332072 h 6858000"/>
+              <a:gd name="connsiteX100" fmla="*/ 5041705 w 6096000"/>
+              <a:gd name="connsiteY100" fmla="*/ 3362948 h 6858000"/>
+              <a:gd name="connsiteX101" fmla="*/ 5047477 w 6096000"/>
+              <a:gd name="connsiteY101" fmla="*/ 3378959 h 6858000"/>
+              <a:gd name="connsiteX102" fmla="*/ 5060758 w 6096000"/>
+              <a:gd name="connsiteY102" fmla="*/ 3407057 h 6858000"/>
+              <a:gd name="connsiteX103" fmla="*/ 5058968 w 6096000"/>
+              <a:gd name="connsiteY103" fmla="*/ 3409825 h 6858000"/>
+              <a:gd name="connsiteX104" fmla="*/ 5062667 w 6096000"/>
+              <a:gd name="connsiteY104" fmla="*/ 3415218 h 6858000"/>
+              <a:gd name="connsiteX105" fmla="*/ 5060928 w 6096000"/>
+              <a:gd name="connsiteY105" fmla="*/ 3419880 h 6858000"/>
+              <a:gd name="connsiteX106" fmla="*/ 5062923 w 6096000"/>
+              <a:gd name="connsiteY106" fmla="*/ 3424545 h 6858000"/>
+              <a:gd name="connsiteX107" fmla="*/ 5064623 w 6096000"/>
+              <a:gd name="connsiteY107" fmla="*/ 3476412 h 6858000"/>
+              <a:gd name="connsiteX108" fmla="*/ 5069684 w 6096000"/>
+              <a:gd name="connsiteY108" fmla="*/ 3486850 h 6858000"/>
+              <a:gd name="connsiteX109" fmla="*/ 5063339 w 6096000"/>
+              <a:gd name="connsiteY109" fmla="*/ 3496391 h 6858000"/>
+              <a:gd name="connsiteX110" fmla="*/ 5070139 w 6096000"/>
+              <a:gd name="connsiteY110" fmla="*/ 3531201 h 6858000"/>
+              <a:gd name="connsiteX111" fmla="*/ 5079896 w 6096000"/>
+              <a:gd name="connsiteY111" fmla="*/ 3542019 h 6858000"/>
+              <a:gd name="connsiteX112" fmla="*/ 5087540 w 6096000"/>
+              <a:gd name="connsiteY112" fmla="*/ 3552249 h 6858000"/>
+              <a:gd name="connsiteX113" fmla="*/ 5087902 w 6096000"/>
+              <a:gd name="connsiteY113" fmla="*/ 3553678 h 6858000"/>
+              <a:gd name="connsiteX114" fmla="*/ 5091509 w 6096000"/>
+              <a:gd name="connsiteY114" fmla="*/ 3568021 h 6858000"/>
+              <a:gd name="connsiteX115" fmla="*/ 5091934 w 6096000"/>
+              <a:gd name="connsiteY115" fmla="*/ 3569719 h 6858000"/>
+              <a:gd name="connsiteX116" fmla="*/ 5089362 w 6096000"/>
+              <a:gd name="connsiteY116" fmla="*/ 3586412 h 6858000"/>
+              <a:gd name="connsiteX117" fmla="*/ 5092358 w 6096000"/>
+              <a:gd name="connsiteY117" fmla="*/ 3597336 h 6858000"/>
+              <a:gd name="connsiteX118" fmla="*/ 5084254 w 6096000"/>
+              <a:gd name="connsiteY118" fmla="*/ 3606007 h 6858000"/>
+              <a:gd name="connsiteX119" fmla="*/ 5084281 w 6096000"/>
+              <a:gd name="connsiteY119" fmla="*/ 3641228 h 6858000"/>
+              <a:gd name="connsiteX120" fmla="*/ 5091848 w 6096000"/>
+              <a:gd name="connsiteY120" fmla="*/ 3653088 h 6858000"/>
+              <a:gd name="connsiteX121" fmla="*/ 5097436 w 6096000"/>
+              <a:gd name="connsiteY121" fmla="*/ 3664114 h 6858000"/>
+              <a:gd name="connsiteX122" fmla="*/ 5097518 w 6096000"/>
+              <a:gd name="connsiteY122" fmla="*/ 3665569 h 6858000"/>
+              <a:gd name="connsiteX123" fmla="*/ 5099829 w 6096000"/>
+              <a:gd name="connsiteY123" fmla="*/ 3707357 h 6858000"/>
+              <a:gd name="connsiteX124" fmla="*/ 5114696 w 6096000"/>
+              <a:gd name="connsiteY124" fmla="*/ 3778166 h 6858000"/>
+              <a:gd name="connsiteX125" fmla="*/ 5135379 w 6096000"/>
+              <a:gd name="connsiteY125" fmla="*/ 3878222 h 6858000"/>
+              <a:gd name="connsiteX126" fmla="*/ 5130138 w 6096000"/>
+              <a:gd name="connsiteY126" fmla="*/ 4048117 h 6858000"/>
+              <a:gd name="connsiteX127" fmla="*/ 5090040 w 6096000"/>
+              <a:gd name="connsiteY127" fmla="*/ 4219510 h 6858000"/>
+              <a:gd name="connsiteX128" fmla="*/ 5092812 w 6096000"/>
+              <a:gd name="connsiteY128" fmla="*/ 4411258 h 6858000"/>
+              <a:gd name="connsiteX129" fmla="*/ 5084599 w 6096000"/>
+              <a:gd name="connsiteY129" fmla="*/ 4488531 h 6858000"/>
+              <a:gd name="connsiteX130" fmla="*/ 5084072 w 6096000"/>
+              <a:gd name="connsiteY130" fmla="*/ 4539168 h 6858000"/>
+              <a:gd name="connsiteX131" fmla="*/ 5068936 w 6096000"/>
+              <a:gd name="connsiteY131" fmla="*/ 4625153 h 6858000"/>
+              <a:gd name="connsiteX132" fmla="*/ 5059114 w 6096000"/>
+              <a:gd name="connsiteY132" fmla="*/ 4733115 h 6858000"/>
+              <a:gd name="connsiteX133" fmla="*/ 5037209 w 6096000"/>
+              <a:gd name="connsiteY133" fmla="*/ 4844323 h 6858000"/>
+              <a:gd name="connsiteX134" fmla="*/ 5020638 w 6096000"/>
+              <a:gd name="connsiteY134" fmla="*/ 4877992 h 6858000"/>
+              <a:gd name="connsiteX135" fmla="*/ 5006413 w 6096000"/>
+              <a:gd name="connsiteY135" fmla="*/ 4925805 h 6858000"/>
+              <a:gd name="connsiteX136" fmla="*/ 4971037 w 6096000"/>
+              <a:gd name="connsiteY136" fmla="*/ 5009272 h 6858000"/>
+              <a:gd name="connsiteX137" fmla="*/ 4963105 w 6096000"/>
+              <a:gd name="connsiteY137" fmla="*/ 5111369 h 6858000"/>
+              <a:gd name="connsiteX138" fmla="*/ 4976341 w 6096000"/>
+              <a:gd name="connsiteY138" fmla="*/ 5210876 h 6858000"/>
+              <a:gd name="connsiteX139" fmla="*/ 4980617 w 6096000"/>
+              <a:gd name="connsiteY139" fmla="*/ 5269726 h 6858000"/>
+              <a:gd name="connsiteX140" fmla="*/ 4997733 w 6096000"/>
+              <a:gd name="connsiteY140" fmla="*/ 5464225 h 6858000"/>
+              <a:gd name="connsiteX141" fmla="*/ 5001400 w 6096000"/>
+              <a:gd name="connsiteY141" fmla="*/ 5594585 h 6858000"/>
+              <a:gd name="connsiteX142" fmla="*/ 4983700 w 6096000"/>
+              <a:gd name="connsiteY142" fmla="*/ 5667896 h 6858000"/>
+              <a:gd name="connsiteX143" fmla="*/ 4968506 w 6096000"/>
+              <a:gd name="connsiteY143" fmla="*/ 5769225 h 6858000"/>
+              <a:gd name="connsiteX144" fmla="*/ 4969765 w 6096000"/>
+              <a:gd name="connsiteY144" fmla="*/ 5823324 h 6858000"/>
+              <a:gd name="connsiteX145" fmla="*/ 4966129 w 6096000"/>
+              <a:gd name="connsiteY145" fmla="*/ 5862699 h 6858000"/>
+              <a:gd name="connsiteX146" fmla="*/ 4970695 w 6096000"/>
+              <a:gd name="connsiteY146" fmla="*/ 5906467 h 6858000"/>
+              <a:gd name="connsiteX147" fmla="*/ 4991568 w 6096000"/>
+              <a:gd name="connsiteY147" fmla="*/ 5939847 h 6858000"/>
+              <a:gd name="connsiteX148" fmla="*/ 4986815 w 6096000"/>
+              <a:gd name="connsiteY148" fmla="*/ 5973994 h 6858000"/>
+              <a:gd name="connsiteX149" fmla="*/ 4987776 w 6096000"/>
+              <a:gd name="connsiteY149" fmla="*/ 6089693 h 6858000"/>
+              <a:gd name="connsiteX150" fmla="*/ 4991621 w 6096000"/>
+              <a:gd name="connsiteY150" fmla="*/ 6224938 h 6858000"/>
+              <a:gd name="connsiteX151" fmla="*/ 5017157 w 6096000"/>
+              <a:gd name="connsiteY151" fmla="*/ 6370251 h 6858000"/>
+              <a:gd name="connsiteX152" fmla="*/ 5040797 w 6096000"/>
+              <a:gd name="connsiteY152" fmla="*/ 6541313 h 6858000"/>
+              <a:gd name="connsiteX153" fmla="*/ 5045375 w 6096000"/>
+              <a:gd name="connsiteY153" fmla="*/ 6640957 h 6858000"/>
+              <a:gd name="connsiteX154" fmla="*/ 5058442 w 6096000"/>
+              <a:gd name="connsiteY154" fmla="*/ 6705297 h 6858000"/>
+              <a:gd name="connsiteX155" fmla="*/ 5071125 w 6096000"/>
+              <a:gd name="connsiteY155" fmla="*/ 6759582 h 6858000"/>
+              <a:gd name="connsiteX156" fmla="*/ 5069172 w 6096000"/>
+              <a:gd name="connsiteY156" fmla="*/ 6817746 h 6858000"/>
+              <a:gd name="connsiteX157" fmla="*/ 5072322 w 6096000"/>
+              <a:gd name="connsiteY157" fmla="*/ 6843646 h 6858000"/>
+              <a:gd name="connsiteX158" fmla="*/ 5091388 w 6096000"/>
+              <a:gd name="connsiteY158" fmla="*/ 6857998 h 6858000"/>
+              <a:gd name="connsiteX159" fmla="*/ 6096000 w 6096000"/>
+              <a:gd name="connsiteY159" fmla="*/ 6857998 h 6858000"/>
+              <a:gd name="connsiteX160" fmla="*/ 6096000 w 6096000"/>
+              <a:gd name="connsiteY160" fmla="*/ 6858000 h 6858000"/>
+              <a:gd name="connsiteX161" fmla="*/ 0 w 6096000"/>
+              <a:gd name="connsiteY161" fmla="*/ 6858000 h 6858000"/>
+            </a:gdLst>
+            <a:ahLst/>
+            <a:cxnLst>
+              <a:cxn ang="0">
+                <a:pos x="connsiteX0" y="connsiteY0"/>
+              </a:cxn>
+              <a:cxn ang="0">
+                <a:pos x="connsiteX1" y="connsiteY1"/>
+              </a:cxn>
+              <a:cxn ang="0">
+                <a:pos x="connsiteX2" y="connsiteY2"/>
+              </a:cxn>
+              <a:cxn ang="0">
+                <a:pos x="connsiteX3" y="connsiteY3"/>
+              </a:cxn>
+              <a:cxn ang="0">
+                <a:pos x="connsiteX4" y="connsiteY4"/>
+              </a:cxn>
+              <a:cxn ang="0">
+                <a:pos x="connsiteX5" y="connsiteY5"/>
+              </a:cxn>
+              <a:cxn ang="0">
+                <a:pos x="connsiteX6" y="connsiteY6"/>
+              </a:cxn>
+              <a:cxn ang="0">
+                <a:pos x="connsiteX7" y="connsiteY7"/>
+              </a:cxn>
+              <a:cxn ang="0">
+                <a:pos x="connsiteX8" y="connsiteY8"/>
+              </a:cxn>
+              <a:cxn ang="0">
+                <a:pos x="connsiteX9" y="connsiteY9"/>
+              </a:cxn>
+              <a:cxn ang="0">
+                <a:pos x="connsiteX10" y="connsiteY10"/>
+              </a:cxn>
+              <a:cxn ang="0">
+                <a:pos x="connsiteX11" y="connsiteY11"/>
+              </a:cxn>
+              <a:cxn ang="0">
+                <a:pos x="connsiteX12" y="connsiteY12"/>
+              </a:cxn>
+              <a:cxn ang="0">
+                <a:pos x="connsiteX13" y="connsiteY13"/>
+              </a:cxn>
+              <a:cxn ang="0">
+                <a:pos x="connsiteX14" y="connsiteY14"/>
+              </a:cxn>
+              <a:cxn ang="0">
+                <a:pos x="connsiteX15" y="connsiteY15"/>
+              </a:cxn>
+              <a:cxn ang="0">
+                <a:pos x="connsiteX16" y="connsiteY16"/>
+              </a:cxn>
+              <a:cxn ang="0">
+                <a:pos x="connsiteX17" y="connsiteY17"/>
+              </a:cxn>
+              <a:cxn ang="0">
+                <a:pos x="connsiteX18" y="connsiteY18"/>
+              </a:cxn>
+              <a:cxn ang="0">
+                <a:pos x="connsiteX19" y="connsiteY19"/>
+              </a:cxn>
+              <a:cxn ang="0">
+                <a:pos x="connsiteX20" y="connsiteY20"/>
+              </a:cxn>
+              <a:cxn ang="0">
+                <a:pos x="connsiteX21" y="connsiteY21"/>
+              </a:cxn>
+              <a:cxn ang="0">
+                <a:pos x="connsiteX22" y="connsiteY22"/>
+              </a:cxn>
+              <a:cxn ang="0">
+                <a:pos x="connsiteX23" y="connsiteY23"/>
+              </a:cxn>
+              <a:cxn ang="0">
+                <a:pos x="connsiteX24" y="connsiteY24"/>
+              </a:cxn>
+              <a:cxn ang="0">
+                <a:pos x="connsiteX25" y="connsiteY25"/>
+              </a:cxn>
+              <a:cxn ang="0">
+                <a:pos x="connsiteX26" y="connsiteY26"/>
+              </a:cxn>
+              <a:cxn ang="0">
+                <a:pos x="connsiteX27" y="connsiteY27"/>
+              </a:cxn>
+              <a:cxn ang="0">
+                <a:pos x="connsiteX28" y="connsiteY28"/>
+              </a:cxn>
+              <a:cxn ang="0">
+                <a:pos x="connsiteX29" y="connsiteY29"/>
+              </a:cxn>
+              <a:cxn ang="0">
+                <a:pos x="connsiteX30" y="connsiteY30"/>
+              </a:cxn>
+              <a:cxn ang="0">
+                <a:pos x="connsiteX31" y="connsiteY31"/>
+              </a:cxn>
+              <a:cxn ang="0">
+                <a:pos x="connsiteX32" y="connsiteY32"/>
+              </a:cxn>
+              <a:cxn ang="0">
+                <a:pos x="connsiteX33" y="connsiteY33"/>
+              </a:cxn>
+              <a:cxn ang="0">
+                <a:pos x="connsiteX34" y="connsiteY34"/>
+              </a:cxn>
+              <a:cxn ang="0">
+                <a:pos x="connsiteX35" y="connsiteY35"/>
+              </a:cxn>
+              <a:cxn ang="0">
+                <a:pos x="connsiteX36" y="connsiteY36"/>
+              </a:cxn>
+              <a:cxn ang="0">
+                <a:pos x="connsiteX37" y="connsiteY37"/>
+              </a:cxn>
+              <a:cxn ang="0">
+                <a:pos x="connsiteX38" y="connsiteY38"/>
+              </a:cxn>
+              <a:cxn ang="0">
+                <a:pos x="connsiteX39" y="connsiteY39"/>
+              </a:cxn>
+              <a:cxn ang="0">
+                <a:pos x="connsiteX40" y="connsiteY40"/>
+              </a:cxn>
+              <a:cxn ang="0">
+                <a:pos x="connsiteX41" y="connsiteY41"/>
+              </a:cxn>
+              <a:cxn ang="0">
+                <a:pos x="connsiteX42" y="connsiteY42"/>
+              </a:cxn>
+              <a:cxn ang="0">
+                <a:pos x="connsiteX43" y="connsiteY43"/>
+              </a:cxn>
+              <a:cxn ang="0">
+                <a:pos x="connsiteX44" y="connsiteY44"/>
+              </a:cxn>
+              <a:cxn ang="0">
+                <a:pos x="connsiteX45" y="connsiteY45"/>
+              </a:cxn>
+              <a:cxn ang="0">
+                <a:pos x="connsiteX46" y="connsiteY46"/>
+              </a:cxn>
+              <a:cxn ang="0">
+                <a:pos x="connsiteX47" y="connsiteY47"/>
+              </a:cxn>
+              <a:cxn ang="0">
+                <a:pos x="connsiteX48" y="connsiteY48"/>
+              </a:cxn>
+              <a:cxn ang="0">
+                <a:pos x="connsiteX49" y="connsiteY49"/>
+              </a:cxn>
+              <a:cxn ang="0">
+                <a:pos x="connsiteX50" y="connsiteY50"/>
+              </a:cxn>
+              <a:cxn ang="0">
+                <a:pos x="connsiteX51" y="connsiteY51"/>
+              </a:cxn>
+              <a:cxn ang="0">
+                <a:pos x="connsiteX52" y="connsiteY52"/>
+              </a:cxn>
+              <a:cxn ang="0">
+                <a:pos x="connsiteX53" y="connsiteY53"/>
+              </a:cxn>
+              <a:cxn ang="0">
+                <a:pos x="connsiteX54" y="connsiteY54"/>
+              </a:cxn>
+              <a:cxn ang="0">
+                <a:pos x="connsiteX55" y="connsiteY55"/>
+              </a:cxn>
+              <a:cxn ang="0">
+                <a:pos x="connsiteX56" y="connsiteY56"/>
+              </a:cxn>
+              <a:cxn ang="0">
+                <a:pos x="connsiteX57" y="connsiteY57"/>
+              </a:cxn>
+              <a:cxn ang="0">
+                <a:pos x="connsiteX58" y="connsiteY58"/>
+              </a:cxn>
+              <a:cxn ang="0">
+                <a:pos x="connsiteX59" y="connsiteY59"/>
+              </a:cxn>
+              <a:cxn ang="0">
+                <a:pos x="connsiteX60" y="connsiteY60"/>
+              </a:cxn>
+              <a:cxn ang="0">
+                <a:pos x="connsiteX61" y="connsiteY61"/>
+              </a:cxn>
+              <a:cxn ang="0">
+                <a:pos x="connsiteX62" y="connsiteY62"/>
+              </a:cxn>
+              <a:cxn ang="0">
+                <a:pos x="connsiteX63" y="connsiteY63"/>
+              </a:cxn>
+              <a:cxn ang="0">
+                <a:pos x="connsiteX64" y="connsiteY64"/>
+              </a:cxn>
+              <a:cxn ang="0">
+                <a:pos x="connsiteX65" y="connsiteY65"/>
+              </a:cxn>
+              <a:cxn ang="0">
+                <a:pos x="connsiteX66" y="connsiteY66"/>
+              </a:cxn>
+              <a:cxn ang="0">
+                <a:pos x="connsiteX67" y="connsiteY67"/>
+              </a:cxn>
+              <a:cxn ang="0">
+                <a:pos x="connsiteX68" y="connsiteY68"/>
+              </a:cxn>
+              <a:cxn ang="0">
+                <a:pos x="connsiteX69" y="connsiteY69"/>
+              </a:cxn>
+              <a:cxn ang="0">
+                <a:pos x="connsiteX70" y="connsiteY70"/>
+              </a:cxn>
+              <a:cxn ang="0">
+                <a:pos x="connsiteX71" y="connsiteY71"/>
+              </a:cxn>
+              <a:cxn ang="0">
+                <a:pos x="connsiteX72" y="connsiteY72"/>
+              </a:cxn>
+              <a:cxn ang="0">
+                <a:pos x="connsiteX73" y="connsiteY73"/>
+              </a:cxn>
+              <a:cxn ang="0">
+                <a:pos x="connsiteX74" y="connsiteY74"/>
+              </a:cxn>
+              <a:cxn ang="0">
+                <a:pos x="connsiteX75" y="connsiteY75"/>
+              </a:cxn>
+              <a:cxn ang="0">
+                <a:pos x="connsiteX76" y="connsiteY76"/>
+              </a:cxn>
+              <a:cxn ang="0">
+                <a:pos x="connsiteX77" y="connsiteY77"/>
+              </a:cxn>
+              <a:cxn ang="0">
+                <a:pos x="connsiteX78" y="connsiteY78"/>
+              </a:cxn>
+              <a:cxn ang="0">
+                <a:pos x="connsiteX79" y="connsiteY79"/>
+              </a:cxn>
+              <a:cxn ang="0">
+                <a:pos x="connsiteX80" y="connsiteY80"/>
+              </a:cxn>
+              <a:cxn ang="0">
+                <a:pos x="connsiteX81" y="connsiteY81"/>
+              </a:cxn>
+              <a:cxn ang="0">
+                <a:pos x="connsiteX82" y="connsiteY82"/>
+              </a:cxn>
+              <a:cxn ang="0">
+                <a:pos x="connsiteX83" y="connsiteY83"/>
+              </a:cxn>
+              <a:cxn ang="0">
+                <a:pos x="connsiteX84" y="connsiteY84"/>
+              </a:cxn>
+              <a:cxn ang="0">
+                <a:pos x="connsiteX85" y="connsiteY85"/>
+              </a:cxn>
+              <a:cxn ang="0">
+                <a:pos x="connsiteX86" y="connsiteY86"/>
+              </a:cxn>
+              <a:cxn ang="0">
+                <a:pos x="connsiteX87" y="connsiteY87"/>
+              </a:cxn>
+              <a:cxn ang="0">
+                <a:pos x="connsiteX88" y="connsiteY88"/>
+              </a:cxn>
+              <a:cxn ang="0">
+                <a:pos x="connsiteX89" y="connsiteY89"/>
+              </a:cxn>
+              <a:cxn ang="0">
+                <a:pos x="connsiteX90" y="connsiteY90"/>
+              </a:cxn>
+              <a:cxn ang="0">
+                <a:pos x="connsiteX91" y="connsiteY91"/>
+              </a:cxn>
+              <a:cxn ang="0">
+                <a:pos x="connsiteX92" y="connsiteY92"/>
+              </a:cxn>
+              <a:cxn ang="0">
+                <a:pos x="connsiteX93" y="connsiteY93"/>
+              </a:cxn>
+              <a:cxn ang="0">
+                <a:pos x="connsiteX94" y="connsiteY94"/>
+              </a:cxn>
+              <a:cxn ang="0">
+                <a:pos x="connsiteX95" y="connsiteY95"/>
+              </a:cxn>
+              <a:cxn ang="0">
+                <a:pos x="connsiteX96" y="connsiteY96"/>
+              </a:cxn>
+              <a:cxn ang="0">
+                <a:pos x="connsiteX97" y="connsiteY97"/>
+              </a:cxn>
+              <a:cxn ang="0">
+                <a:pos x="connsiteX98" y="connsiteY98"/>
+              </a:cxn>
+              <a:cxn ang="0">
+                <a:pos x="connsiteX99" y="connsiteY99"/>
+              </a:cxn>
+              <a:cxn ang="0">
+                <a:pos x="connsiteX100" y="connsiteY100"/>
+              </a:cxn>
+              <a:cxn ang="0">
+                <a:pos x="connsiteX101" y="connsiteY101"/>
+              </a:cxn>
+              <a:cxn ang="0">
+                <a:pos x="connsiteX102" y="connsiteY102"/>
+              </a:cxn>
+              <a:cxn ang="0">
+                <a:pos x="connsiteX103" y="connsiteY103"/>
+              </a:cxn>
+              <a:cxn ang="0">
+                <a:pos x="connsiteX104" y="connsiteY104"/>
+              </a:cxn>
+              <a:cxn ang="0">
+                <a:pos x="connsiteX105" y="connsiteY105"/>
+              </a:cxn>
+              <a:cxn ang="0">
+                <a:pos x="connsiteX106" y="connsiteY106"/>
+              </a:cxn>
+              <a:cxn ang="0">
+                <a:pos x="connsiteX107" y="connsiteY107"/>
+              </a:cxn>
+              <a:cxn ang="0">
+                <a:pos x="connsiteX108" y="connsiteY108"/>
+              </a:cxn>
+              <a:cxn ang="0">
+                <a:pos x="connsiteX109" y="connsiteY109"/>
+              </a:cxn>
+              <a:cxn ang="0">
+                <a:pos x="connsiteX110" y="connsiteY110"/>
+              </a:cxn>
+              <a:cxn ang="0">
+                <a:pos x="connsiteX111" y="connsiteY111"/>
+              </a:cxn>
+              <a:cxn ang="0">
+                <a:pos x="connsiteX112" y="connsiteY112"/>
+              </a:cxn>
+              <a:cxn ang="0">
+                <a:pos x="connsiteX113" y="connsiteY113"/>
+              </a:cxn>
+              <a:cxn ang="0">
+                <a:pos x="connsiteX114" y="connsiteY114"/>
+              </a:cxn>
+              <a:cxn ang="0">
+                <a:pos x="connsiteX115" y="connsiteY115"/>
+              </a:cxn>
+              <a:cxn ang="0">
+                <a:pos x="connsiteX116" y="connsiteY116"/>
+              </a:cxn>
+              <a:cxn ang="0">
+                <a:pos x="connsiteX117" y="connsiteY117"/>
+              </a:cxn>
+              <a:cxn ang="0">
+                <a:pos x="connsiteX118" y="connsiteY118"/>
+              </a:cxn>
+              <a:cxn ang="0">
+                <a:pos x="connsiteX119" y="connsiteY119"/>
+              </a:cxn>
+              <a:cxn ang="0">
+                <a:pos x="connsiteX120" y="connsiteY120"/>
+              </a:cxn>
+              <a:cxn ang="0">
+                <a:pos x="connsiteX121" y="connsiteY121"/>
+              </a:cxn>
+              <a:cxn ang="0">
+                <a:pos x="connsiteX122" y="connsiteY122"/>
+              </a:cxn>
+              <a:cxn ang="0">
+                <a:pos x="connsiteX123" y="connsiteY123"/>
+              </a:cxn>
+              <a:cxn ang="0">
+                <a:pos x="connsiteX124" y="connsiteY124"/>
+              </a:cxn>
+              <a:cxn ang="0">
+                <a:pos x="connsiteX125" y="connsiteY125"/>
+              </a:cxn>
+              <a:cxn ang="0">
+                <a:pos x="connsiteX126" y="connsiteY126"/>
+              </a:cxn>
+              <a:cxn ang="0">
+                <a:pos x="connsiteX127" y="connsiteY127"/>
+              </a:cxn>
+              <a:cxn ang="0">
+                <a:pos x="connsiteX128" y="connsiteY128"/>
+              </a:cxn>
+              <a:cxn ang="0">
+                <a:pos x="connsiteX129" y="connsiteY129"/>
+              </a:cxn>
+              <a:cxn ang="0">
+                <a:pos x="connsiteX130" y="connsiteY130"/>
+              </a:cxn>
+              <a:cxn ang="0">
+                <a:pos x="connsiteX131" y="connsiteY131"/>
+              </a:cxn>
+              <a:cxn ang="0">
+                <a:pos x="connsiteX132" y="connsiteY132"/>
+              </a:cxn>
+              <a:cxn ang="0">
+                <a:pos x="connsiteX133" y="connsiteY133"/>
+              </a:cxn>
+              <a:cxn ang="0">
+                <a:pos x="connsiteX134" y="connsiteY134"/>
+              </a:cxn>
+              <a:cxn ang="0">
+                <a:pos x="connsiteX135" y="connsiteY135"/>
+              </a:cxn>
+              <a:cxn ang="0">
+                <a:pos x="connsiteX136" y="connsiteY136"/>
+              </a:cxn>
+              <a:cxn ang="0">
+                <a:pos x="connsiteX137" y="connsiteY137"/>
+              </a:cxn>
+              <a:cxn ang="0">
+                <a:pos x="connsiteX138" y="connsiteY138"/>
+              </a:cxn>
+              <a:cxn ang="0">
+                <a:pos x="connsiteX139" y="connsiteY139"/>
+              </a:cxn>
+              <a:cxn ang="0">
+                <a:pos x="connsiteX140" y="connsiteY140"/>
+              </a:cxn>
+              <a:cxn ang="0">
+                <a:pos x="connsiteX141" y="connsiteY141"/>
+              </a:cxn>
+              <a:cxn ang="0">
+                <a:pos x="connsiteX142" y="connsiteY142"/>
+              </a:cxn>
+              <a:cxn ang="0">
+                <a:pos x="connsiteX143" y="connsiteY143"/>
+              </a:cxn>
+              <a:cxn ang="0">
+                <a:pos x="connsiteX144" y="connsiteY144"/>
+              </a:cxn>
+              <a:cxn ang="0">
+                <a:pos x="connsiteX145" y="connsiteY145"/>
+              </a:cxn>
+              <a:cxn ang="0">
+                <a:pos x="connsiteX146" y="connsiteY146"/>
+              </a:cxn>
+              <a:cxn ang="0">
+                <a:pos x="connsiteX147" y="connsiteY147"/>
+              </a:cxn>
+              <a:cxn ang="0">
+                <a:pos x="connsiteX148" y="connsiteY148"/>
+              </a:cxn>
+              <a:cxn ang="0">
+                <a:pos x="connsiteX149" y="connsiteY149"/>
+              </a:cxn>
+              <a:cxn ang="0">
+                <a:pos x="connsiteX150" y="connsiteY150"/>
+              </a:cxn>
+              <a:cxn ang="0">
+                <a:pos x="connsiteX151" y="connsiteY151"/>
+              </a:cxn>
+              <a:cxn ang="0">
+                <a:pos x="connsiteX152" y="connsiteY152"/>
+              </a:cxn>
+              <a:cxn ang="0">
+                <a:pos x="connsiteX153" y="connsiteY153"/>
+              </a:cxn>
+              <a:cxn ang="0">
+                <a:pos x="connsiteX154" y="connsiteY154"/>
+              </a:cxn>
+              <a:cxn ang="0">
+                <a:pos x="connsiteX155" y="connsiteY155"/>
+              </a:cxn>
+              <a:cxn ang="0">
+                <a:pos x="connsiteX156" y="connsiteY156"/>
+              </a:cxn>
+              <a:cxn ang="0">
+                <a:pos x="connsiteX157" y="connsiteY157"/>
+              </a:cxn>
+              <a:cxn ang="0">
+                <a:pos x="connsiteX158" y="connsiteY158"/>
+              </a:cxn>
+              <a:cxn ang="0">
+                <a:pos x="connsiteX159" y="connsiteY159"/>
+              </a:cxn>
+              <a:cxn ang="0">
+                <a:pos x="connsiteX160" y="connsiteY160"/>
+              </a:cxn>
+              <a:cxn ang="0">
+                <a:pos x="connsiteX161" y="connsiteY161"/>
+              </a:cxn>
+            </a:cxnLst>
+            <a:rect l="l" t="t" r="r" b="b"/>
+            <a:pathLst>
+              <a:path w="6096000" h="6858000">
+                <a:moveTo>
+                  <a:pt x="0" y="0"/>
+                </a:moveTo>
+                <a:lnTo>
+                  <a:pt x="5567517" y="0"/>
+                </a:lnTo>
+                <a:lnTo>
+                  <a:pt x="5566938" y="1705"/>
+                </a:lnTo>
+                <a:cubicBezTo>
+                  <a:pt x="5563126" y="8440"/>
+                  <a:pt x="5558112" y="13784"/>
+                  <a:pt x="5551594" y="17287"/>
+                </a:cubicBezTo>
+                <a:cubicBezTo>
+                  <a:pt x="5562364" y="82036"/>
+                  <a:pt x="5510349" y="69804"/>
+                  <a:pt x="5545641" y="130336"/>
+                </a:cubicBezTo>
+                <a:cubicBezTo>
+                  <a:pt x="5526953" y="117589"/>
+                  <a:pt x="5536978" y="162458"/>
+                  <a:pt x="5538289" y="187093"/>
+                </a:cubicBezTo>
+                <a:cubicBezTo>
+                  <a:pt x="5536205" y="226511"/>
+                  <a:pt x="5545722" y="205530"/>
+                  <a:pt x="5545790" y="265704"/>
+                </a:cubicBezTo>
+                <a:cubicBezTo>
+                  <a:pt x="5542296" y="317533"/>
+                  <a:pt x="5543813" y="325288"/>
+                  <a:pt x="5542313" y="354566"/>
+                </a:cubicBezTo>
+                <a:lnTo>
+                  <a:pt x="5524126" y="472000"/>
+                </a:lnTo>
+                <a:lnTo>
+                  <a:pt x="5522170" y="473782"/>
+                </a:lnTo>
+                <a:cubicBezTo>
+                  <a:pt x="5517847" y="482008"/>
+                  <a:pt x="5518682" y="487340"/>
+                  <a:pt x="5521798" y="491380"/>
+                </a:cubicBezTo>
+                <a:lnTo>
+                  <a:pt x="5536419" y="531675"/>
+                </a:lnTo>
+                <a:lnTo>
+                  <a:pt x="5533435" y="536015"/>
+                </a:lnTo>
+                <a:lnTo>
+                  <a:pt x="5538088" y="572092"/>
+                </a:lnTo>
+                <a:lnTo>
+                  <a:pt x="5536061" y="572511"/>
+                </a:lnTo>
+                <a:cubicBezTo>
+                  <a:pt x="5531611" y="574271"/>
+                  <a:pt x="5528529" y="577121"/>
+                  <a:pt x="5528218" y="582332"/>
+                </a:cubicBezTo>
+                <a:cubicBezTo>
+                  <a:pt x="5498002" y="573171"/>
+                  <a:pt x="5516262" y="585107"/>
+                  <a:pt x="5518011" y="601285"/>
+                </a:cubicBezTo>
+                <a:cubicBezTo>
+                  <a:pt x="5508838" y="617831"/>
+                  <a:pt x="5480684" y="666964"/>
+                  <a:pt x="5473174" y="681608"/>
+                </a:cubicBezTo>
+                <a:cubicBezTo>
+                  <a:pt x="5473102" y="684122"/>
+                  <a:pt x="5473033" y="686637"/>
+                  <a:pt x="5472963" y="689151"/>
+                </a:cubicBezTo>
+                <a:lnTo>
+                  <a:pt x="5472485" y="689289"/>
+                </a:lnTo>
+                <a:cubicBezTo>
+                  <a:pt x="5471434" y="690905"/>
+                  <a:pt x="5470986" y="693376"/>
+                  <a:pt x="5471326" y="697222"/>
+                </a:cubicBezTo>
+                <a:cubicBezTo>
+                  <a:pt x="5471606" y="703992"/>
+                  <a:pt x="5471884" y="710761"/>
+                  <a:pt x="5472164" y="717531"/>
+                </a:cubicBezTo>
+                <a:lnTo>
+                  <a:pt x="5468891" y="722494"/>
+                </a:lnTo>
+                <a:lnTo>
+                  <a:pt x="5463081" y="724368"/>
+                </a:lnTo>
+                <a:lnTo>
+                  <a:pt x="5446981" y="752692"/>
+                </a:lnTo>
+                <a:cubicBezTo>
+                  <a:pt x="5454691" y="764380"/>
+                  <a:pt x="5422719" y="808083"/>
+                  <a:pt x="5417190" y="816346"/>
+                </a:cubicBezTo>
+                <a:lnTo>
+                  <a:pt x="5388958" y="889417"/>
+                </a:lnTo>
+                <a:cubicBezTo>
+                  <a:pt x="5320491" y="969963"/>
+                  <a:pt x="5321907" y="1005331"/>
+                  <a:pt x="5307044" y="1063288"/>
+                </a:cubicBezTo>
+                <a:cubicBezTo>
+                  <a:pt x="5313332" y="1111028"/>
+                  <a:pt x="5317096" y="1110140"/>
+                  <a:pt x="5303837" y="1157176"/>
+                </a:cubicBezTo>
+                <a:cubicBezTo>
+                  <a:pt x="5301103" y="1192124"/>
+                  <a:pt x="5301884" y="1197232"/>
+                  <a:pt x="5286494" y="1210776"/>
+                </a:cubicBezTo>
+                <a:lnTo>
+                  <a:pt x="5282463" y="1301993"/>
+                </a:lnTo>
+                <a:lnTo>
+                  <a:pt x="5252235" y="1360879"/>
+                </a:lnTo>
+                <a:lnTo>
+                  <a:pt x="5244497" y="1404045"/>
+                </a:lnTo>
+                <a:lnTo>
+                  <a:pt x="5223823" y="1429568"/>
+                </a:lnTo>
+                <a:lnTo>
+                  <a:pt x="5224851" y="1430305"/>
+                </a:lnTo>
+                <a:cubicBezTo>
+                  <a:pt x="5226697" y="1432466"/>
+                  <a:pt x="5214738" y="1459891"/>
+                  <a:pt x="5212394" y="1463304"/>
+                </a:cubicBezTo>
+                <a:cubicBezTo>
+                  <a:pt x="5209912" y="1477394"/>
+                  <a:pt x="5213027" y="1501295"/>
+                  <a:pt x="5209958" y="1514846"/>
+                </a:cubicBezTo>
+                <a:lnTo>
+                  <a:pt x="5206417" y="1519731"/>
+                </a:lnTo>
+                <a:lnTo>
+                  <a:pt x="5206640" y="1519929"/>
+                </a:lnTo>
+                <a:cubicBezTo>
+                  <a:pt x="5206490" y="1521210"/>
+                  <a:pt x="5209710" y="1543635"/>
+                  <a:pt x="5207632" y="1546022"/>
+                </a:cubicBezTo>
+                <a:lnTo>
+                  <a:pt x="5212030" y="1578752"/>
+                </a:lnTo>
+                <a:cubicBezTo>
+                  <a:pt x="5206147" y="1605585"/>
+                  <a:pt x="5226381" y="1622803"/>
+                  <a:pt x="5203533" y="1647555"/>
+                </a:cubicBezTo>
+                <a:cubicBezTo>
+                  <a:pt x="5198128" y="1672675"/>
+                  <a:pt x="5203213" y="1694404"/>
+                  <a:pt x="5190877" y="1715685"/>
+                </a:cubicBezTo>
+                <a:cubicBezTo>
+                  <a:pt x="5196815" y="1724301"/>
+                  <a:pt x="5198098" y="1732435"/>
+                  <a:pt x="5184235" y="1740358"/>
+                </a:cubicBezTo>
+                <a:cubicBezTo>
+                  <a:pt x="5182625" y="1763793"/>
+                  <a:pt x="5198368" y="1769422"/>
+                  <a:pt x="5181475" y="1784314"/>
+                </a:cubicBezTo>
+                <a:cubicBezTo>
+                  <a:pt x="5205987" y="1797417"/>
+                  <a:pt x="5195246" y="1798221"/>
+                  <a:pt x="5185845" y="1804434"/>
+                </a:cubicBezTo>
+                <a:lnTo>
+                  <a:pt x="5185068" y="1805316"/>
+                </a:lnTo>
+                <a:lnTo>
+                  <a:pt x="5188593" y="1807109"/>
+                </a:lnTo>
+                <a:lnTo>
+                  <a:pt x="5185920" y="1821003"/>
+                </a:lnTo>
+                <a:lnTo>
+                  <a:pt x="5183543" y="1824832"/>
+                </a:lnTo>
+                <a:cubicBezTo>
+                  <a:pt x="5182284" y="1827468"/>
+                  <a:pt x="5181937" y="1829219"/>
+                  <a:pt x="5182235" y="1830429"/>
+                </a:cubicBezTo>
+                <a:lnTo>
+                  <a:pt x="5182525" y="1830569"/>
+                </a:lnTo>
+                <a:lnTo>
+                  <a:pt x="5180663" y="1835810"/>
+                </a:lnTo>
+                <a:cubicBezTo>
+                  <a:pt x="5176779" y="1844665"/>
+                  <a:pt x="5172297" y="1853278"/>
+                  <a:pt x="5167452" y="1861483"/>
+                </a:cubicBezTo>
+                <a:cubicBezTo>
+                  <a:pt x="5179827" y="1866643"/>
+                  <a:pt x="5166788" y="1884999"/>
+                  <a:pt x="5174266" y="1892417"/>
+                </a:cubicBezTo>
+                <a:lnTo>
+                  <a:pt x="5189262" y="1895114"/>
+                </a:lnTo>
+                <a:lnTo>
+                  <a:pt x="5187100" y="1899379"/>
+                </a:lnTo>
+                <a:lnTo>
+                  <a:pt x="5180471" y="1907867"/>
+                </a:lnTo>
+                <a:cubicBezTo>
+                  <a:pt x="5179609" y="1909162"/>
+                  <a:pt x="5179647" y="1909994"/>
+                  <a:pt x="5181361" y="1910265"/>
+                </a:cubicBezTo>
+                <a:cubicBezTo>
+                  <a:pt x="5180995" y="1914884"/>
+                  <a:pt x="5177893" y="1930292"/>
+                  <a:pt x="5178268" y="1935584"/>
+                </a:cubicBezTo>
+                <a:lnTo>
+                  <a:pt x="5183619" y="1942021"/>
+                </a:lnTo>
+                <a:lnTo>
+                  <a:pt x="5184480" y="1945112"/>
+                </a:lnTo>
+                <a:lnTo>
+                  <a:pt x="5172776" y="1961162"/>
+                </a:lnTo>
+                <a:lnTo>
+                  <a:pt x="5168513" y="1969445"/>
+                </a:lnTo>
+                <a:lnTo>
+                  <a:pt x="5126597" y="2024270"/>
+                </a:lnTo>
+                <a:lnTo>
+                  <a:pt x="5119528" y="2107942"/>
+                </a:lnTo>
+                <a:cubicBezTo>
+                  <a:pt x="5089290" y="2138038"/>
+                  <a:pt x="5110415" y="2159228"/>
+                  <a:pt x="5110356" y="2193455"/>
+                </a:cubicBezTo>
+                <a:cubicBezTo>
+                  <a:pt x="5101302" y="2220953"/>
+                  <a:pt x="5110381" y="2224200"/>
+                  <a:pt x="5104992" y="2260088"/>
+                </a:cubicBezTo>
+                <a:cubicBezTo>
+                  <a:pt x="5096504" y="2291744"/>
+                  <a:pt x="5078225" y="2299003"/>
+                  <a:pt x="5059439" y="2335735"/>
+                </a:cubicBezTo>
+                <a:cubicBezTo>
+                  <a:pt x="5029465" y="2329020"/>
+                  <a:pt x="5058046" y="2407546"/>
+                  <a:pt x="5022061" y="2408995"/>
+                </a:cubicBezTo>
+                <a:cubicBezTo>
+                  <a:pt x="5023289" y="2413465"/>
+                  <a:pt x="5019654" y="2441580"/>
+                  <a:pt x="5022253" y="2445869"/>
+                </a:cubicBezTo>
+                <a:cubicBezTo>
+                  <a:pt x="5022440" y="2449625"/>
+                  <a:pt x="5011241" y="2492743"/>
+                  <a:pt x="5011426" y="2496499"/>
+                </a:cubicBezTo>
+                <a:lnTo>
+                  <a:pt x="4994224" y="2549900"/>
+                </a:lnTo>
+                <a:cubicBezTo>
+                  <a:pt x="4992353" y="2564757"/>
+                  <a:pt x="4998952" y="2582253"/>
+                  <a:pt x="4995245" y="2596456"/>
+                </a:cubicBezTo>
+                <a:lnTo>
+                  <a:pt x="4988570" y="2606088"/>
+                </a:lnTo>
+                <a:cubicBezTo>
+                  <a:pt x="4988504" y="2615842"/>
+                  <a:pt x="4988436" y="2625597"/>
+                  <a:pt x="4988371" y="2635351"/>
+                </a:cubicBezTo>
+                <a:lnTo>
+                  <a:pt x="4983212" y="2665666"/>
+                </a:lnTo>
+                <a:lnTo>
+                  <a:pt x="4968234" y="2715895"/>
+                </a:lnTo>
+                <a:lnTo>
+                  <a:pt x="4975888" y="2725052"/>
+                </a:lnTo>
+                <a:lnTo>
+                  <a:pt x="4980195" y="2726489"/>
+                </a:lnTo>
+                <a:lnTo>
+                  <a:pt x="4976218" y="2740278"/>
+                </a:lnTo>
+                <a:lnTo>
+                  <a:pt x="4980571" y="2751112"/>
+                </a:lnTo>
+                <a:lnTo>
+                  <a:pt x="4973893" y="2760208"/>
+                </a:lnTo>
+                <a:lnTo>
+                  <a:pt x="4979005" y="2790136"/>
+                </a:lnTo>
+                <a:lnTo>
+                  <a:pt x="4986137" y="2804183"/>
+                </a:lnTo>
+                <a:cubicBezTo>
+                  <a:pt x="4986150" y="2811409"/>
+                  <a:pt x="4986162" y="2818634"/>
+                  <a:pt x="4986175" y="2825860"/>
+                </a:cubicBezTo>
+                <a:cubicBezTo>
+                  <a:pt x="4987474" y="2843788"/>
+                  <a:pt x="4992871" y="2886513"/>
+                  <a:pt x="4993936" y="2911749"/>
+                </a:cubicBezTo>
+                <a:cubicBezTo>
+                  <a:pt x="4993313" y="2946689"/>
+                  <a:pt x="4980300" y="2954448"/>
+                  <a:pt x="4992563" y="2977278"/>
+                </a:cubicBezTo>
+                <a:cubicBezTo>
+                  <a:pt x="4985688" y="2983455"/>
+                  <a:pt x="4982051" y="2987749"/>
+                  <a:pt x="4980516" y="2991092"/>
+                </a:cubicBezTo>
+                <a:cubicBezTo>
+                  <a:pt x="4975910" y="3001119"/>
+                  <a:pt x="4990216" y="3002537"/>
+                  <a:pt x="4992801" y="3020247"/>
+                </a:cubicBezTo>
+                <a:cubicBezTo>
+                  <a:pt x="4998517" y="3032637"/>
+                  <a:pt x="5013148" y="3051512"/>
+                  <a:pt x="5014805" y="3065434"/>
+                </a:cubicBezTo>
+                <a:cubicBezTo>
+                  <a:pt x="4998836" y="3057428"/>
+                  <a:pt x="5016840" y="3105196"/>
+                  <a:pt x="5002733" y="3103777"/>
+                </a:cubicBezTo>
+                <a:cubicBezTo>
+                  <a:pt x="5022381" y="3124610"/>
+                  <a:pt x="4997365" y="3128169"/>
+                  <a:pt x="5002941" y="3151828"/>
+                </a:cubicBezTo>
+                <a:cubicBezTo>
+                  <a:pt x="5010264" y="3163902"/>
+                  <a:pt x="5011356" y="3171780"/>
+                  <a:pt x="5002883" y="3180546"/>
+                </a:cubicBezTo>
+                <a:cubicBezTo>
+                  <a:pt x="5038586" y="3236545"/>
+                  <a:pt x="5003723" y="3210316"/>
+                  <a:pt x="5016711" y="3258677"/>
+                </a:cubicBezTo>
+                <a:lnTo>
+                  <a:pt x="5017918" y="3262610"/>
+                </a:lnTo>
+                <a:lnTo>
+                  <a:pt x="5011672" y="3277179"/>
+                </a:lnTo>
+                <a:lnTo>
+                  <a:pt x="5009344" y="3278130"/>
+                </a:lnTo>
+                <a:lnTo>
+                  <a:pt x="5026770" y="3325671"/>
+                </a:lnTo>
+                <a:lnTo>
+                  <a:pt x="5024571" y="3332072"/>
+                </a:lnTo>
+                <a:lnTo>
+                  <a:pt x="5041705" y="3362948"/>
+                </a:lnTo>
+                <a:lnTo>
+                  <a:pt x="5047477" y="3378959"/>
+                </a:lnTo>
+                <a:lnTo>
+                  <a:pt x="5060758" y="3407057"/>
+                </a:lnTo>
+                <a:lnTo>
+                  <a:pt x="5058968" y="3409825"/>
+                </a:lnTo>
+                <a:lnTo>
+                  <a:pt x="5062667" y="3415218"/>
+                </a:lnTo>
+                <a:lnTo>
+                  <a:pt x="5060928" y="3419880"/>
+                </a:lnTo>
+                <a:lnTo>
+                  <a:pt x="5062923" y="3424545"/>
+                </a:lnTo>
+                <a:cubicBezTo>
+                  <a:pt x="5063537" y="3433967"/>
+                  <a:pt x="5063494" y="3466028"/>
+                  <a:pt x="5064623" y="3476412"/>
+                </a:cubicBezTo>
+                <a:lnTo>
+                  <a:pt x="5069684" y="3486850"/>
+                </a:lnTo>
+                <a:lnTo>
+                  <a:pt x="5063339" y="3496391"/>
+                </a:lnTo>
+                <a:lnTo>
+                  <a:pt x="5070139" y="3531201"/>
+                </a:lnTo>
+                <a:lnTo>
+                  <a:pt x="5079896" y="3542019"/>
+                </a:lnTo>
+                <a:lnTo>
+                  <a:pt x="5087540" y="3552249"/>
+                </a:lnTo>
+                <a:lnTo>
+                  <a:pt x="5087902" y="3553678"/>
+                </a:lnTo>
+                <a:lnTo>
+                  <a:pt x="5091509" y="3568021"/>
+                </a:lnTo>
+                <a:lnTo>
+                  <a:pt x="5091934" y="3569719"/>
+                </a:lnTo>
+                <a:lnTo>
+                  <a:pt x="5089362" y="3586412"/>
+                </a:lnTo>
+                <a:lnTo>
+                  <a:pt x="5092358" y="3597336"/>
+                </a:lnTo>
+                <a:lnTo>
+                  <a:pt x="5084254" y="3606007"/>
+                </a:lnTo>
+                <a:cubicBezTo>
+                  <a:pt x="5084262" y="3617747"/>
+                  <a:pt x="5084273" y="3629488"/>
+                  <a:pt x="5084281" y="3641228"/>
+                </a:cubicBezTo>
+                <a:lnTo>
+                  <a:pt x="5091848" y="3653088"/>
+                </a:lnTo>
+                <a:lnTo>
+                  <a:pt x="5097436" y="3664114"/>
+                </a:lnTo>
+                <a:cubicBezTo>
+                  <a:pt x="5097463" y="3664599"/>
+                  <a:pt x="5097491" y="3665084"/>
+                  <a:pt x="5097518" y="3665569"/>
+                </a:cubicBezTo>
+                <a:cubicBezTo>
+                  <a:pt x="5097915" y="3672776"/>
+                  <a:pt x="5096966" y="3688591"/>
+                  <a:pt x="5099829" y="3707357"/>
+                </a:cubicBezTo>
+                <a:cubicBezTo>
+                  <a:pt x="5100505" y="3724716"/>
+                  <a:pt x="5118078" y="3760234"/>
+                  <a:pt x="5114696" y="3778166"/>
+                </a:cubicBezTo>
+                <a:cubicBezTo>
+                  <a:pt x="5141627" y="3845122"/>
+                  <a:pt x="5125427" y="3821305"/>
+                  <a:pt x="5135379" y="3878222"/>
+                </a:cubicBezTo>
+                <a:cubicBezTo>
+                  <a:pt x="5161519" y="3905047"/>
+                  <a:pt x="5125417" y="4015047"/>
+                  <a:pt x="5130138" y="4048117"/>
+                </a:cubicBezTo>
+                <a:cubicBezTo>
+                  <a:pt x="5081804" y="4192084"/>
+                  <a:pt x="5096262" y="4158987"/>
+                  <a:pt x="5090040" y="4219510"/>
+                </a:cubicBezTo>
+                <a:cubicBezTo>
+                  <a:pt x="5104553" y="4280033"/>
+                  <a:pt x="5065380" y="4345686"/>
+                  <a:pt x="5092812" y="4411258"/>
+                </a:cubicBezTo>
+                <a:cubicBezTo>
+                  <a:pt x="5090630" y="4437329"/>
+                  <a:pt x="5083878" y="4473140"/>
+                  <a:pt x="5084599" y="4488531"/>
+                </a:cubicBezTo>
+                <a:cubicBezTo>
+                  <a:pt x="5084423" y="4505410"/>
+                  <a:pt x="5084248" y="4522289"/>
+                  <a:pt x="5084072" y="4539168"/>
+                </a:cubicBezTo>
+                <a:cubicBezTo>
+                  <a:pt x="5072114" y="4567830"/>
+                  <a:pt x="5064305" y="4588197"/>
+                  <a:pt x="5068936" y="4625153"/>
+                </a:cubicBezTo>
+                <a:cubicBezTo>
+                  <a:pt x="5077433" y="4662889"/>
+                  <a:pt x="5065899" y="4679357"/>
+                  <a:pt x="5059114" y="4733115"/>
+                </a:cubicBezTo>
+                <a:cubicBezTo>
+                  <a:pt x="5068687" y="4752352"/>
+                  <a:pt x="5055370" y="4832308"/>
+                  <a:pt x="5037209" y="4844323"/>
+                </a:cubicBezTo>
+                <a:cubicBezTo>
+                  <a:pt x="5033444" y="4857054"/>
+                  <a:pt x="5040194" y="4871554"/>
+                  <a:pt x="5020638" y="4877992"/>
+                </a:cubicBezTo>
+                <a:cubicBezTo>
+                  <a:pt x="4997151" y="4888353"/>
+                  <a:pt x="5034418" y="4931200"/>
+                  <a:pt x="5006413" y="4925805"/>
+                </a:cubicBezTo>
+                <a:cubicBezTo>
+                  <a:pt x="5031964" y="4956261"/>
+                  <a:pt x="4982840" y="4982633"/>
+                  <a:pt x="4971037" y="5009272"/>
+                </a:cubicBezTo>
+                <a:cubicBezTo>
+                  <a:pt x="4973259" y="5034036"/>
+                  <a:pt x="4968375" y="5053859"/>
+                  <a:pt x="4963105" y="5111369"/>
+                </a:cubicBezTo>
+                <a:cubicBezTo>
+                  <a:pt x="4973224" y="5141336"/>
+                  <a:pt x="4937413" y="5161742"/>
+                  <a:pt x="4976341" y="5210876"/>
+                </a:cubicBezTo>
+                <a:cubicBezTo>
+                  <a:pt x="4972455" y="5212581"/>
+                  <a:pt x="4977054" y="5227501"/>
+                  <a:pt x="4980617" y="5269726"/>
+                </a:cubicBezTo>
+                <a:cubicBezTo>
+                  <a:pt x="4984182" y="5311951"/>
+                  <a:pt x="4990390" y="5400671"/>
+                  <a:pt x="4997733" y="5464225"/>
+                </a:cubicBezTo>
+                <a:cubicBezTo>
+                  <a:pt x="5001765" y="5536542"/>
+                  <a:pt x="4990225" y="5517959"/>
+                  <a:pt x="5001400" y="5594585"/>
+                </a:cubicBezTo>
+                <a:cubicBezTo>
+                  <a:pt x="4999908" y="5619318"/>
+                  <a:pt x="4974042" y="5647975"/>
+                  <a:pt x="4983700" y="5667896"/>
+                </a:cubicBezTo>
+                <a:cubicBezTo>
+                  <a:pt x="4976834" y="5696311"/>
+                  <a:pt x="4975579" y="5738356"/>
+                  <a:pt x="4968506" y="5769225"/>
+                </a:cubicBezTo>
+                <a:cubicBezTo>
+                  <a:pt x="4968926" y="5787258"/>
+                  <a:pt x="4969344" y="5805291"/>
+                  <a:pt x="4969765" y="5823324"/>
+                </a:cubicBezTo>
+                <a:cubicBezTo>
+                  <a:pt x="4966122" y="5853058"/>
+                  <a:pt x="4965608" y="5838948"/>
+                  <a:pt x="4966129" y="5862699"/>
+                </a:cubicBezTo>
+                <a:lnTo>
+                  <a:pt x="4970695" y="5906467"/>
+                </a:lnTo>
+                <a:lnTo>
+                  <a:pt x="4991568" y="5939847"/>
+                </a:lnTo>
+                <a:cubicBezTo>
+                  <a:pt x="4998848" y="5955713"/>
+                  <a:pt x="4974731" y="5940131"/>
+                  <a:pt x="4986815" y="5973994"/>
+                </a:cubicBezTo>
+                <a:cubicBezTo>
+                  <a:pt x="4961187" y="5997051"/>
+                  <a:pt x="4983444" y="6032039"/>
+                  <a:pt x="4987776" y="6089693"/>
+                </a:cubicBezTo>
+                <a:lnTo>
+                  <a:pt x="4991621" y="6224938"/>
+                </a:lnTo>
+                <a:cubicBezTo>
+                  <a:pt x="4988442" y="6270972"/>
+                  <a:pt x="5008962" y="6317522"/>
+                  <a:pt x="5017157" y="6370251"/>
+                </a:cubicBezTo>
+                <a:cubicBezTo>
+                  <a:pt x="5025353" y="6422980"/>
+                  <a:pt x="5039938" y="6490855"/>
+                  <a:pt x="5040797" y="6541313"/>
+                </a:cubicBezTo>
+                <a:cubicBezTo>
+                  <a:pt x="5039898" y="6576319"/>
+                  <a:pt x="5031912" y="6591883"/>
+                  <a:pt x="5045375" y="6640957"/>
+                </a:cubicBezTo>
+                <a:cubicBezTo>
+                  <a:pt x="5057505" y="6669536"/>
+                  <a:pt x="5052276" y="6675394"/>
+                  <a:pt x="5058442" y="6705297"/>
+                </a:cubicBezTo>
+                <a:cubicBezTo>
+                  <a:pt x="5057367" y="6727133"/>
+                  <a:pt x="5067901" y="6732087"/>
+                  <a:pt x="5071125" y="6759582"/>
+                </a:cubicBezTo>
+                <a:cubicBezTo>
+                  <a:pt x="5055614" y="6796071"/>
+                  <a:pt x="5051656" y="6769544"/>
+                  <a:pt x="5069172" y="6817746"/>
+                </a:cubicBezTo>
+                <a:cubicBezTo>
+                  <a:pt x="5060956" y="6828354"/>
+                  <a:pt x="5064525" y="6836369"/>
+                  <a:pt x="5072322" y="6843646"/>
+                </a:cubicBezTo>
+                <a:lnTo>
+                  <a:pt x="5091388" y="6857998"/>
+                </a:lnTo>
+                <a:lnTo>
+                  <a:pt x="6096000" y="6857998"/>
+                </a:lnTo>
+                <a:lnTo>
+                  <a:pt x="6096000" y="6858000"/>
+                </a:lnTo>
+                <a:lnTo>
+                  <a:pt x="0" y="6858000"/>
+                </a:lnTo>
+                <a:close/>
+              </a:path>
+            </a:pathLst>
+          </a:custGeom>
           <a:solidFill>
             <a:srgbClr val="82766A">
               <a:alpha val="15000"/>
@@ -9744,7 +12386,9 @@
           </a:fontRef>
         </p:style>
         <p:txBody>
-          <a:bodyPr rtlCol="0" anchor="ctr"/>
+          <a:bodyPr wrap="square" rtlCol="0" anchor="ctr">
+            <a:noAutofit/>
+          </a:bodyPr>
           <a:lstStyle/>
           <a:p>
             <a:pPr algn="ctr"/>
@@ -9752,411 +12396,6 @@
           </a:p>
         </p:txBody>
       </p:sp>
-      <p:pic>
-        <p:nvPicPr>
-          <p:cNvPr id="8" name="Picture 7" descr="A diagram of a flowchart&#10;&#10;AI-generated content may be incorrect.">
-            <a:extLst>
-              <a:ext uri="{FF2B5EF4-FFF2-40B4-BE49-F238E27FC236}">
-                <a16:creationId xmlns:a16="http://schemas.microsoft.com/office/drawing/2014/main" id="{15A17609-0C92-2B14-9301-A95D7E0B9297}"/>
-              </a:ext>
-            </a:extLst>
-          </p:cNvPr>
-          <p:cNvPicPr>
-            <a:picLocks noChangeAspect="1"/>
-          </p:cNvPicPr>
-          <p:nvPr/>
-        </p:nvPicPr>
-        <p:blipFill>
-          <a:blip r:embed="rId2"/>
-          <a:srcRect t="19694" r="2" b="3547"/>
-          <a:stretch>
-            <a:fillRect/>
-          </a:stretch>
-        </p:blipFill>
-        <p:spPr>
-          <a:xfrm>
-            <a:off x="20" y="10"/>
-            <a:ext cx="6901711" cy="6857990"/>
-          </a:xfrm>
-          <a:custGeom>
-            <a:avLst/>
-            <a:gdLst/>
-            <a:ahLst/>
-            <a:cxnLst/>
-            <a:rect l="l" t="t" r="r" b="b"/>
-            <a:pathLst>
-              <a:path w="6901731" h="6858000">
-                <a:moveTo>
-                  <a:pt x="0" y="0"/>
-                </a:moveTo>
-                <a:lnTo>
-                  <a:pt x="6897896" y="5958"/>
-                </a:lnTo>
-                <a:lnTo>
-                  <a:pt x="6866823" y="62592"/>
-                </a:lnTo>
-                <a:lnTo>
-                  <a:pt x="6901731" y="89476"/>
-                </a:lnTo>
-                <a:lnTo>
-                  <a:pt x="6901731" y="103833"/>
-                </a:lnTo>
-                <a:lnTo>
-                  <a:pt x="6900034" y="110092"/>
-                </a:lnTo>
-                <a:lnTo>
-                  <a:pt x="6901731" y="113679"/>
-                </a:lnTo>
-                <a:lnTo>
-                  <a:pt x="6901731" y="405560"/>
-                </a:lnTo>
-                <a:lnTo>
-                  <a:pt x="6900456" y="429509"/>
-                </a:lnTo>
-                <a:cubicBezTo>
-                  <a:pt x="6892773" y="535647"/>
-                  <a:pt x="6878314" y="537918"/>
-                  <a:pt x="6886342" y="636808"/>
-                </a:cubicBezTo>
-                <a:cubicBezTo>
-                  <a:pt x="6892506" y="756883"/>
-                  <a:pt x="6864504" y="771443"/>
-                  <a:pt x="6851784" y="839073"/>
-                </a:cubicBezTo>
-                <a:cubicBezTo>
-                  <a:pt x="6838675" y="892655"/>
-                  <a:pt x="6864124" y="961738"/>
-                  <a:pt x="6845760" y="994930"/>
-                </a:cubicBezTo>
-                <a:cubicBezTo>
-                  <a:pt x="6833572" y="1024166"/>
-                  <a:pt x="6859282" y="1058905"/>
-                  <a:pt x="6845601" y="1112932"/>
-                </a:cubicBezTo>
-                <a:cubicBezTo>
-                  <a:pt x="6838700" y="1149910"/>
-                  <a:pt x="6829138" y="1151035"/>
-                  <a:pt x="6820235" y="1187433"/>
-                </a:cubicBezTo>
-                <a:cubicBezTo>
-                  <a:pt x="6815504" y="1196464"/>
-                  <a:pt x="6777707" y="1338549"/>
-                  <a:pt x="6759643" y="1337010"/>
-                </a:cubicBezTo>
-                <a:cubicBezTo>
-                  <a:pt x="6737660" y="1337296"/>
-                  <a:pt x="6760650" y="1396341"/>
-                  <a:pt x="6736375" y="1382272"/>
-                </a:cubicBezTo>
-                <a:cubicBezTo>
-                  <a:pt x="6755741" y="1415836"/>
-                  <a:pt x="6714675" y="1414567"/>
-                  <a:pt x="6701292" y="1432111"/>
-                </a:cubicBezTo>
-                <a:cubicBezTo>
-                  <a:pt x="6721110" y="1460185"/>
-                  <a:pt x="6692106" y="1490815"/>
-                  <a:pt x="6686578" y="1518624"/>
-                </a:cubicBezTo>
-                <a:cubicBezTo>
-                  <a:pt x="6682512" y="1567002"/>
-                  <a:pt x="6679579" y="1571443"/>
-                  <a:pt x="6670824" y="1607743"/>
-                </a:cubicBezTo>
-                <a:cubicBezTo>
-                  <a:pt x="6671133" y="1629590"/>
-                  <a:pt x="6663161" y="1656870"/>
-                  <a:pt x="6664392" y="1696405"/>
-                </a:cubicBezTo>
-                <a:cubicBezTo>
-                  <a:pt x="6655686" y="1770486"/>
-                  <a:pt x="6641938" y="1757082"/>
-                  <a:pt x="6642880" y="1812372"/>
-                </a:cubicBezTo>
-                <a:cubicBezTo>
-                  <a:pt x="6638579" y="1872475"/>
-                  <a:pt x="6619231" y="1825476"/>
-                  <a:pt x="6612547" y="1876437"/>
-                </a:cubicBezTo>
-                <a:cubicBezTo>
-                  <a:pt x="6600695" y="1913834"/>
-                  <a:pt x="6591061" y="1923231"/>
-                  <a:pt x="6571760" y="1953331"/>
-                </a:cubicBezTo>
-                <a:cubicBezTo>
-                  <a:pt x="6561039" y="1989021"/>
-                  <a:pt x="6544090" y="2087896"/>
-                  <a:pt x="6520213" y="2096455"/>
-                </a:cubicBezTo>
-                <a:lnTo>
-                  <a:pt x="6492461" y="2188148"/>
-                </a:lnTo>
-                <a:cubicBezTo>
-                  <a:pt x="6504372" y="2211333"/>
-                  <a:pt x="6489131" y="2253220"/>
-                  <a:pt x="6471854" y="2259117"/>
-                </a:cubicBezTo>
-                <a:cubicBezTo>
-                  <a:pt x="6466151" y="2287829"/>
-                  <a:pt x="6440452" y="2301346"/>
-                  <a:pt x="6439832" y="2328334"/>
-                </a:cubicBezTo>
-                <a:cubicBezTo>
-                  <a:pt x="6431013" y="2351201"/>
-                  <a:pt x="6444250" y="2396409"/>
-                  <a:pt x="6425162" y="2408211"/>
-                </a:cubicBezTo>
-                <a:lnTo>
-                  <a:pt x="6417221" y="2427382"/>
-                </a:lnTo>
-                <a:lnTo>
-                  <a:pt x="6425030" y="2464387"/>
-                </a:lnTo>
-                <a:lnTo>
-                  <a:pt x="6406293" y="2472223"/>
-                </a:lnTo>
-                <a:cubicBezTo>
-                  <a:pt x="6406862" y="2477277"/>
-                  <a:pt x="6406486" y="2491723"/>
-                  <a:pt x="6405400" y="2493547"/>
-                </a:cubicBezTo>
-                <a:lnTo>
-                  <a:pt x="6374829" y="2532070"/>
-                </a:lnTo>
-                <a:cubicBezTo>
-                  <a:pt x="6374597" y="2545374"/>
-                  <a:pt x="6360976" y="2563797"/>
-                  <a:pt x="6350864" y="2577422"/>
-                </a:cubicBezTo>
-                <a:cubicBezTo>
-                  <a:pt x="6327056" y="2632768"/>
-                  <a:pt x="6341262" y="2616275"/>
-                  <a:pt x="6329174" y="2663854"/>
-                </a:cubicBezTo>
-                <a:cubicBezTo>
-                  <a:pt x="6326303" y="2703642"/>
-                  <a:pt x="6332854" y="2709643"/>
-                  <a:pt x="6315095" y="2741507"/>
-                </a:cubicBezTo>
-                <a:cubicBezTo>
-                  <a:pt x="6319921" y="2740191"/>
-                  <a:pt x="6321925" y="2742004"/>
-                  <a:pt x="6322463" y="2745641"/>
-                </a:cubicBezTo>
-                <a:cubicBezTo>
-                  <a:pt x="6322245" y="2747982"/>
-                  <a:pt x="6322027" y="2750323"/>
-                  <a:pt x="6321808" y="2752663"/>
-                </a:cubicBezTo>
-                <a:lnTo>
-                  <a:pt x="6314569" y="2756718"/>
-                </a:lnTo>
-                <a:cubicBezTo>
-                  <a:pt x="6289324" y="2773686"/>
-                  <a:pt x="6317551" y="2780051"/>
-                  <a:pt x="6315211" y="2811618"/>
-                </a:cubicBezTo>
-                <a:cubicBezTo>
-                  <a:pt x="6315620" y="2826627"/>
-                  <a:pt x="6296047" y="2885298"/>
-                  <a:pt x="6302211" y="2882314"/>
-                </a:cubicBezTo>
-                <a:lnTo>
-                  <a:pt x="6286167" y="2949597"/>
-                </a:lnTo>
-                <a:cubicBezTo>
-                  <a:pt x="6286401" y="2994618"/>
-                  <a:pt x="6286615" y="2971464"/>
-                  <a:pt x="6287037" y="3008578"/>
-                </a:cubicBezTo>
-                <a:cubicBezTo>
-                  <a:pt x="6293795" y="3029535"/>
-                  <a:pt x="6274405" y="3114154"/>
-                  <a:pt x="6259150" y="3123139"/>
-                </a:cubicBezTo>
-                <a:cubicBezTo>
-                  <a:pt x="6250085" y="3189063"/>
-                  <a:pt x="6269067" y="3151280"/>
-                  <a:pt x="6272249" y="3227854"/>
-                </a:cubicBezTo>
-                <a:cubicBezTo>
-                  <a:pt x="6278775" y="3295842"/>
-                  <a:pt x="6289216" y="3303765"/>
-                  <a:pt x="6292288" y="3378383"/>
-                </a:cubicBezTo>
-                <a:cubicBezTo>
-                  <a:pt x="6303894" y="3395995"/>
-                  <a:pt x="6287498" y="3432581"/>
-                  <a:pt x="6288328" y="3459618"/>
-                </a:cubicBezTo>
-                <a:cubicBezTo>
-                  <a:pt x="6289158" y="3486653"/>
-                  <a:pt x="6299937" y="3538735"/>
-                  <a:pt x="6297272" y="3540603"/>
-                </a:cubicBezTo>
-                <a:cubicBezTo>
-                  <a:pt x="6296849" y="3577379"/>
-                  <a:pt x="6294184" y="3587943"/>
-                  <a:pt x="6291001" y="3638374"/>
-                </a:cubicBezTo>
-                <a:cubicBezTo>
-                  <a:pt x="6283026" y="3666794"/>
-                  <a:pt x="6265833" y="3731744"/>
-                  <a:pt x="6283592" y="3763609"/>
-                </a:cubicBezTo>
-                <a:cubicBezTo>
-                  <a:pt x="6264286" y="3758340"/>
-                  <a:pt x="6290177" y="3803150"/>
-                  <a:pt x="6274068" y="3814506"/>
-                </a:cubicBezTo>
-                <a:cubicBezTo>
-                  <a:pt x="6260645" y="3821643"/>
-                  <a:pt x="6265372" y="3836902"/>
-                  <a:pt x="6262850" y="3850454"/>
-                </a:cubicBezTo>
-                <a:cubicBezTo>
-                  <a:pt x="6250418" y="3863479"/>
-                  <a:pt x="6250660" y="3955243"/>
-                  <a:pt x="6257357" y="3975474"/>
-                </a:cubicBezTo>
-                <a:cubicBezTo>
-                  <a:pt x="6245091" y="4036737"/>
-                  <a:pt x="6237535" y="4029237"/>
-                  <a:pt x="6257889" y="4073155"/>
-                </a:cubicBezTo>
-                <a:cubicBezTo>
-                  <a:pt x="6259272" y="4085906"/>
-                  <a:pt x="6239882" y="4116397"/>
-                  <a:pt x="6237441" y="4126638"/>
-                </a:cubicBezTo>
-                <a:lnTo>
-                  <a:pt x="6245587" y="4172738"/>
-                </a:lnTo>
-                <a:lnTo>
-                  <a:pt x="6235772" y="4176721"/>
-                </a:lnTo>
-                <a:lnTo>
-                  <a:pt x="6233287" y="4195136"/>
-                </a:lnTo>
-                <a:lnTo>
-                  <a:pt x="6234619" y="4280850"/>
-                </a:lnTo>
-                <a:cubicBezTo>
-                  <a:pt x="6239453" y="4320763"/>
-                  <a:pt x="6223309" y="4337596"/>
-                  <a:pt x="6219318" y="4402526"/>
-                </a:cubicBezTo>
-                <a:cubicBezTo>
-                  <a:pt x="6205466" y="4516209"/>
-                  <a:pt x="6216183" y="4588729"/>
-                  <a:pt x="6216810" y="4651172"/>
-                </a:cubicBezTo>
-                <a:cubicBezTo>
-                  <a:pt x="6217673" y="4756959"/>
-                  <a:pt x="6228654" y="4824005"/>
-                  <a:pt x="6225945" y="4916779"/>
-                </a:cubicBezTo>
-                <a:cubicBezTo>
-                  <a:pt x="6217032" y="4993010"/>
-                  <a:pt x="6264271" y="4984591"/>
-                  <a:pt x="6230174" y="5051379"/>
-                </a:cubicBezTo>
-                <a:cubicBezTo>
-                  <a:pt x="6235713" y="5056951"/>
-                  <a:pt x="6239420" y="5163714"/>
-                  <a:pt x="6242600" y="5170879"/>
-                </a:cubicBezTo>
-                <a:lnTo>
-                  <a:pt x="6235996" y="5216428"/>
-                </a:lnTo>
-                <a:lnTo>
-                  <a:pt x="6214638" y="5285298"/>
-                </a:lnTo>
-                <a:cubicBezTo>
-                  <a:pt x="6211392" y="5297492"/>
-                  <a:pt x="6225576" y="5312063"/>
-                  <a:pt x="6228432" y="5317696"/>
-                </a:cubicBezTo>
-                <a:lnTo>
-                  <a:pt x="6246496" y="5398787"/>
-                </a:lnTo>
-                <a:lnTo>
-                  <a:pt x="6244793" y="5399530"/>
-                </a:lnTo>
-                <a:lnTo>
-                  <a:pt x="6241695" y="5406948"/>
-                </a:lnTo>
-                <a:lnTo>
-                  <a:pt x="6267461" y="5499413"/>
-                </a:lnTo>
-                <a:cubicBezTo>
-                  <a:pt x="6285387" y="5533848"/>
-                  <a:pt x="6284888" y="5550029"/>
-                  <a:pt x="6295987" y="5582659"/>
-                </a:cubicBezTo>
-                <a:cubicBezTo>
-                  <a:pt x="6311253" y="5681724"/>
-                  <a:pt x="6295439" y="5695558"/>
-                  <a:pt x="6364803" y="5784263"/>
-                </a:cubicBezTo>
-                <a:cubicBezTo>
-                  <a:pt x="6379348" y="5818651"/>
-                  <a:pt x="6412475" y="5906802"/>
-                  <a:pt x="6423050" y="5922637"/>
-                </a:cubicBezTo>
-                <a:cubicBezTo>
-                  <a:pt x="6445210" y="5973612"/>
-                  <a:pt x="6468179" y="6023873"/>
-                  <a:pt x="6497767" y="6090108"/>
-                </a:cubicBezTo>
-                <a:cubicBezTo>
-                  <a:pt x="6571895" y="6150548"/>
-                  <a:pt x="6572491" y="6236583"/>
-                  <a:pt x="6606710" y="6281543"/>
-                </a:cubicBezTo>
-                <a:cubicBezTo>
-                  <a:pt x="6633675" y="6335892"/>
-                  <a:pt x="6654357" y="6388782"/>
-                  <a:pt x="6667540" y="6443715"/>
-                </a:cubicBezTo>
-                <a:cubicBezTo>
-                  <a:pt x="6685192" y="6466826"/>
-                  <a:pt x="6650500" y="6508701"/>
-                  <a:pt x="6659722" y="6550105"/>
-                </a:cubicBezTo>
-                <a:cubicBezTo>
-                  <a:pt x="6665926" y="6645044"/>
-                  <a:pt x="6669126" y="6627536"/>
-                  <a:pt x="6671805" y="6687397"/>
-                </a:cubicBezTo>
-                <a:cubicBezTo>
-                  <a:pt x="6682671" y="6733683"/>
-                  <a:pt x="6665210" y="6772117"/>
-                  <a:pt x="6669658" y="6806602"/>
-                </a:cubicBezTo>
-                <a:cubicBezTo>
-                  <a:pt x="6661174" y="6812658"/>
-                  <a:pt x="6667097" y="6831470"/>
-                  <a:pt x="6675783" y="6850325"/>
-                </a:cubicBezTo>
-                <a:lnTo>
-                  <a:pt x="6679704" y="6858000"/>
-                </a:lnTo>
-                <a:lnTo>
-                  <a:pt x="4532241" y="6858000"/>
-                </a:lnTo>
-                <a:lnTo>
-                  <a:pt x="1208596" y="6858000"/>
-                </a:lnTo>
-                <a:lnTo>
-                  <a:pt x="0" y="6858000"/>
-                </a:lnTo>
-                <a:close/>
-              </a:path>
-            </a:pathLst>
-          </a:custGeom>
-        </p:spPr>
-      </p:pic>
       <p:sp>
         <p:nvSpPr>
           <p:cNvPr id="6" name="TextBox 5">
@@ -10171,8 +12410,8 @@
         </p:nvSpPr>
         <p:spPr>
           <a:xfrm>
-            <a:off x="7320465" y="2194102"/>
-            <a:ext cx="4140013" cy="3908586"/>
+            <a:off x="862366" y="2194102"/>
+            <a:ext cx="3427001" cy="3908586"/>
           </a:xfrm>
           <a:prstGeom prst="rect">
             <a:avLst/>
@@ -10201,6 +12440,37 @@
           </a:p>
         </p:txBody>
       </p:sp>
+      <p:pic>
+        <p:nvPicPr>
+          <p:cNvPr id="8" name="Picture 7" descr="A diagram of a flowchart&#10;&#10;AI-generated content may be incorrect.">
+            <a:extLst>
+              <a:ext uri="{FF2B5EF4-FFF2-40B4-BE49-F238E27FC236}">
+                <a16:creationId xmlns:a16="http://schemas.microsoft.com/office/drawing/2014/main" id="{15A17609-0C92-2B14-9301-A95D7E0B9297}"/>
+              </a:ext>
+            </a:extLst>
+          </p:cNvPr>
+          <p:cNvPicPr>
+            <a:picLocks noChangeAspect="1"/>
+          </p:cNvPicPr>
+          <p:nvPr/>
+        </p:nvPicPr>
+        <p:blipFill>
+          <a:blip r:embed="rId2"/>
+          <a:srcRect t="19694" r="2" b="3547"/>
+          <a:stretch>
+            <a:fillRect/>
+          </a:stretch>
+        </p:blipFill>
+        <p:spPr>
+          <a:xfrm rot="5400000">
+            <a:off x="5744073" y="679524"/>
+            <a:ext cx="5557909" cy="5522693"/>
+          </a:xfrm>
+          <a:prstGeom prst="rect">
+            <a:avLst/>
+          </a:prstGeom>
+        </p:spPr>
+      </p:pic>
     </p:spTree>
     <p:extLst>
       <p:ext uri="{BB962C8B-B14F-4D97-AF65-F5344CB8AC3E}">

</xml_diff>